<commit_message>
1. Presentation updated 2. Table moved to BDT + Appendix table 3. New    catas
</commit_message>
<xml_diff>
--- a/presentations/2021-02-Fermi_prob_catalog_ECAP_ML.pptx
+++ b/presentations/2021-02-Fermi_prob_catalog_ECAP_ML.pptx
@@ -25,22 +25,22 @@
     <p:sldId id="481" r:id="rId13"/>
     <p:sldId id="482" r:id="rId14"/>
     <p:sldId id="483" r:id="rId15"/>
-    <p:sldId id="473" r:id="rId16"/>
-    <p:sldId id="470" r:id="rId17"/>
-    <p:sldId id="471" r:id="rId18"/>
-    <p:sldId id="472" r:id="rId19"/>
-    <p:sldId id="484" r:id="rId20"/>
-    <p:sldId id="485" r:id="rId21"/>
-    <p:sldId id="486" r:id="rId22"/>
-    <p:sldId id="487" r:id="rId23"/>
-    <p:sldId id="468" r:id="rId24"/>
-    <p:sldId id="474" r:id="rId25"/>
-    <p:sldId id="452" r:id="rId26"/>
-    <p:sldId id="458" r:id="rId27"/>
-    <p:sldId id="460" r:id="rId28"/>
-    <p:sldId id="462" r:id="rId29"/>
-    <p:sldId id="461" r:id="rId30"/>
-    <p:sldId id="475" r:id="rId31"/>
+    <p:sldId id="475" r:id="rId16"/>
+    <p:sldId id="473" r:id="rId17"/>
+    <p:sldId id="470" r:id="rId18"/>
+    <p:sldId id="471" r:id="rId19"/>
+    <p:sldId id="472" r:id="rId20"/>
+    <p:sldId id="484" r:id="rId21"/>
+    <p:sldId id="485" r:id="rId22"/>
+    <p:sldId id="486" r:id="rId23"/>
+    <p:sldId id="487" r:id="rId24"/>
+    <p:sldId id="468" r:id="rId25"/>
+    <p:sldId id="474" r:id="rId26"/>
+    <p:sldId id="452" r:id="rId27"/>
+    <p:sldId id="458" r:id="rId28"/>
+    <p:sldId id="460" r:id="rId29"/>
+    <p:sldId id="462" r:id="rId30"/>
+    <p:sldId id="461" r:id="rId31"/>
     <p:sldId id="437" r:id="rId32"/>
     <p:sldId id="469" r:id="rId33"/>
   </p:sldIdLst>
@@ -273,7 +273,7 @@
             <a:fld id="{3189ADB2-8830-3E4F-9C21-386BBEFF5ECC}" type="datetimeFigureOut">
               <a:rPr lang="en-US" smtClean="0"/>
               <a:pPr/>
-              <a:t>2/22/21</a:t>
+              <a:t>2/23/2021</a:t>
             </a:fld>
             <a:endParaRPr lang="en-US"/>
           </a:p>
@@ -340,7 +340,7 @@
             <a:fld id="{331B9277-206D-B84E-BFFB-205D88D02D6E}" type="slidenum">
               <a:rPr lang="en-US" smtClean="0"/>
               <a:pPr/>
-              <a:t>‹#›</a:t>
+              <a:t>‹Nr.›</a:t>
             </a:fld>
             <a:endParaRPr lang="en-US"/>
           </a:p>
@@ -441,7 +441,7 @@
             <a:fld id="{C85F260B-6123-154B-904A-A1AB92F0D5FE}" type="datetimeFigureOut">
               <a:rPr lang="en-US" smtClean="0"/>
               <a:pPr/>
-              <a:t>2/22/21</a:t>
+              <a:t>2/22/2021</a:t>
             </a:fld>
             <a:endParaRPr lang="en-US"/>
           </a:p>
@@ -600,7 +600,7 @@
             <a:fld id="{D6757CD8-65B6-324C-A34B-D149102AC0AE}" type="slidenum">
               <a:rPr lang="en-US" smtClean="0"/>
               <a:pPr/>
-              <a:t>‹#›</a:t>
+              <a:t>‹Nr.›</a:t>
             </a:fld>
             <a:endParaRPr lang="en-US"/>
           </a:p>
@@ -1161,7 +1161,7 @@
           <a:p>
             <a:fld id="{103471C4-0DF0-FF4F-BCCC-44D2780D953F}" type="datetime1">
               <a:rPr lang="en-US" smtClean="0"/>
-              <a:t>2/22/21</a:t>
+              <a:t>2/22/2021</a:t>
             </a:fld>
             <a:endParaRPr lang="en-US"/>
           </a:p>
@@ -1189,7 +1189,7 @@
             <a:fld id="{2BE1FEC3-8823-1349-926D-AB6C326E7D50}" type="slidenum">
               <a:rPr lang="en-US"/>
               <a:pPr/>
-              <a:t>‹#›</a:t>
+              <a:t>‹Nr.›</a:t>
             </a:fld>
             <a:endParaRPr lang="en-US"/>
           </a:p>
@@ -1607,7 +1607,7 @@
           <a:p>
             <a:fld id="{D47E2586-09A2-8443-97E9-9E1CC8856BFD}" type="datetime1">
               <a:rPr lang="en-US" smtClean="0"/>
-              <a:t>2/22/21</a:t>
+              <a:t>2/22/2021</a:t>
             </a:fld>
             <a:endParaRPr lang="en-US"/>
           </a:p>
@@ -1635,7 +1635,7 @@
             <a:fld id="{33900595-0495-7D41-9213-486E137F5EBE}" type="slidenum">
               <a:rPr lang="en-US"/>
               <a:pPr/>
-              <a:t>‹#›</a:t>
+              <a:t>‹Nr.›</a:t>
             </a:fld>
             <a:endParaRPr lang="en-US"/>
           </a:p>
@@ -2065,7 +2065,7 @@
           <a:p>
             <a:fld id="{E8002B35-DFF4-9049-843D-44A6085D396E}" type="datetime1">
               <a:rPr lang="en-US" smtClean="0"/>
-              <a:t>2/22/21</a:t>
+              <a:t>2/22/2021</a:t>
             </a:fld>
             <a:endParaRPr lang="en-US"/>
           </a:p>
@@ -2093,7 +2093,7 @@
             <a:fld id="{8B105637-6452-3041-BF3C-C91CFF1D2D73}" type="slidenum">
               <a:rPr lang="en-US"/>
               <a:pPr/>
-              <a:t>‹#›</a:t>
+              <a:t>‹Nr.›</a:t>
             </a:fld>
             <a:endParaRPr lang="en-US"/>
           </a:p>
@@ -2216,7 +2216,7 @@
           <a:p>
             <a:fld id="{0F057E37-0DE7-3940-BEF3-BD3052280F27}" type="datetime1">
               <a:rPr lang="en-US" smtClean="0"/>
-              <a:t>2/22/21</a:t>
+              <a:t>2/22/2021</a:t>
             </a:fld>
             <a:endParaRPr lang="en-US"/>
           </a:p>
@@ -2244,7 +2244,7 @@
             <a:fld id="{3B1C5E0C-B6CC-CC4D-A1D7-431A14614F40}" type="slidenum">
               <a:rPr lang="en-US"/>
               <a:pPr/>
-              <a:t>‹#›</a:t>
+              <a:t>‹Nr.›</a:t>
             </a:fld>
             <a:endParaRPr lang="en-US"/>
           </a:p>
@@ -2345,7 +2345,7 @@
           <a:p>
             <a:fld id="{779F7A2C-FB4C-AC44-A88F-A5CBCF0D32EC}" type="datetime1">
               <a:rPr lang="en-US" smtClean="0"/>
-              <a:t>2/22/21</a:t>
+              <a:t>2/22/2021</a:t>
             </a:fld>
             <a:endParaRPr lang="en-US"/>
           </a:p>
@@ -2373,7 +2373,7 @@
             <a:fld id="{11FED4F5-065D-3F47-BC26-E608D4320160}" type="slidenum">
               <a:rPr lang="en-US"/>
               <a:pPr/>
-              <a:t>‹#›</a:t>
+              <a:t>‹Nr.›</a:t>
             </a:fld>
             <a:endParaRPr lang="en-US"/>
           </a:p>
@@ -2654,7 +2654,7 @@
           <a:p>
             <a:fld id="{F522DC46-DCD4-5941-8454-39336897E19D}" type="datetime1">
               <a:rPr lang="en-US" smtClean="0"/>
-              <a:t>2/22/21</a:t>
+              <a:t>2/22/2021</a:t>
             </a:fld>
             <a:endParaRPr lang="en-US"/>
           </a:p>
@@ -2682,7 +2682,7 @@
             <a:fld id="{8BC245A3-4723-5549-B5C0-92DD3A2F6AFA}" type="slidenum">
               <a:rPr lang="en-US"/>
               <a:pPr/>
-              <a:t>‹#›</a:t>
+              <a:t>‹Nr.›</a:t>
             </a:fld>
             <a:endParaRPr lang="en-US"/>
           </a:p>
@@ -3029,14 +3029,14 @@
           </a:ln>
           <a:extLst>
             <a:ext uri="{909E8E84-426E-40dd-AFC4-6F175D3DCCD1}">
-              <a14:hiddenFill xmlns:a14="http://schemas.microsoft.com/office/drawing/2010/main" xmlns="">
+              <a14:hiddenFill xmlns="" xmlns:a14="http://schemas.microsoft.com/office/drawing/2010/main">
                 <a:solidFill>
                   <a:srgbClr val="FFFFFF"/>
                 </a:solidFill>
               </a14:hiddenFill>
             </a:ext>
             <a:ext uri="{91240B29-F687-4f45-9708-019B960494DF}">
-              <a14:hiddenLine xmlns:a14="http://schemas.microsoft.com/office/drawing/2010/main" xmlns="" w="9525">
+              <a14:hiddenLine xmlns="" xmlns:a14="http://schemas.microsoft.com/office/drawing/2010/main" w="9525">
                 <a:solidFill>
                   <a:srgbClr val="000000"/>
                 </a:solidFill>
@@ -3046,7 +3046,7 @@
               </a14:hiddenLine>
             </a:ext>
             <a:ext uri="{FAA26D3D-D897-4be2-8F04-BA451C77F1D7}">
-              <ma14:placeholderFlag xmlns:ma14="http://schemas.microsoft.com/office/mac/drawingml/2011/main" xmlns="" val="1"/>
+              <ma14:placeholderFlag xmlns="" xmlns:ma14="http://schemas.microsoft.com/office/mac/drawingml/2011/main" val="1"/>
             </a:ext>
           </a:extLst>
         </p:spPr>
@@ -3222,7 +3222,7 @@
           <a:p>
             <a:fld id="{04DC5BFA-818F-8D40-A035-7726C59AF3B0}" type="datetime1">
               <a:rPr lang="en-US" smtClean="0"/>
-              <a:t>2/22/21</a:t>
+              <a:t>2/22/2021</a:t>
             </a:fld>
             <a:endParaRPr lang="en-US"/>
           </a:p>
@@ -3266,7 +3266,7 @@
             <a:fld id="{C0E3A5C4-944E-9249-BF19-30D09D029497}" type="slidenum">
               <a:rPr lang="en-US"/>
               <a:pPr/>
-              <a:t>‹#›</a:t>
+              <a:t>‹Nr.›</a:t>
             </a:fld>
             <a:endParaRPr lang="en-US"/>
           </a:p>
@@ -4055,14 +4055,14 @@
           </a:ln>
           <a:extLst>
             <a:ext uri="{909E8E84-426E-40dd-AFC4-6F175D3DCCD1}">
-              <a14:hiddenFill xmlns:a14="http://schemas.microsoft.com/office/drawing/2010/main" xmlns="">
+              <a14:hiddenFill xmlns="" xmlns:a14="http://schemas.microsoft.com/office/drawing/2010/main">
                 <a:solidFill>
                   <a:srgbClr val="FFFFFF"/>
                 </a:solidFill>
               </a14:hiddenFill>
             </a:ext>
             <a:ext uri="{91240B29-F687-4f45-9708-019B960494DF}">
-              <a14:hiddenLine xmlns:a14="http://schemas.microsoft.com/office/drawing/2010/main" xmlns="" w="9525">
+              <a14:hiddenLine xmlns="" xmlns:a14="http://schemas.microsoft.com/office/drawing/2010/main" w="9525">
                 <a:solidFill>
                   <a:srgbClr val="000000"/>
                 </a:solidFill>
@@ -4072,7 +4072,7 @@
               </a14:hiddenLine>
             </a:ext>
             <a:ext uri="{FAA26D3D-D897-4be2-8F04-BA451C77F1D7}">
-              <ma14:placeholderFlag xmlns:ma14="http://schemas.microsoft.com/office/mac/drawingml/2011/main" xmlns="" val="1"/>
+              <ma14:placeholderFlag xmlns="" xmlns:ma14="http://schemas.microsoft.com/office/mac/drawingml/2011/main" val="1"/>
             </a:ext>
           </a:extLst>
         </p:spPr>
@@ -4687,7 +4687,7 @@
           <a:p>
             <a:r>
               <a:rPr lang="en-US" dirty="0"/>
-              <a:t>Non AGN or PSR sources (which we denote by OTHER class) are present among unassociated sources</a:t>
+              <a:t>Non-AGN or PSR sources (denoted now by OTHER class) are present among unassociated sources</a:t>
             </a:r>
           </a:p>
           <a:p>
@@ -5096,7 +5096,7 @@
         </p:nvGrpSpPr>
         <p:grpSpPr>
           <a:xfrm>
-            <a:off x="232220" y="2841838"/>
+            <a:off x="651914" y="2841837"/>
             <a:ext cx="8302180" cy="2339762"/>
             <a:chOff x="171717" y="2769239"/>
             <a:chExt cx="8302180" cy="2339762"/>
@@ -5379,12 +5379,47 @@
           </a:p>
         </p:txBody>
       </p:sp>
+      <p:sp>
+        <p:nvSpPr>
+          <p:cNvPr id="12" name="TextBox 11">
+            <a:extLst>
+              <a:ext uri="{FF2B5EF4-FFF2-40B4-BE49-F238E27FC236}">
+                <a16:creationId xmlns:a16="http://schemas.microsoft.com/office/drawing/2014/main" id="{30EADCF1-3CBB-9843-9029-1FCFB3EF1032}"/>
+              </a:ext>
+            </a:extLst>
+          </p:cNvPr>
+          <p:cNvSpPr txBox="1"/>
+          <p:nvPr/>
+        </p:nvSpPr>
+        <p:spPr>
+          <a:xfrm>
+            <a:off x="7023045" y="3943141"/>
+            <a:ext cx="915635" cy="369332"/>
+          </a:xfrm>
+          <a:prstGeom prst="rect">
+            <a:avLst/>
+          </a:prstGeom>
+          <a:noFill/>
+        </p:spPr>
+        <p:txBody>
+          <a:bodyPr wrap="none" rtlCol="0">
+            <a:spAutoFit/>
+          </a:bodyPr>
+          <a:lstStyle/>
+          <a:p>
+            <a:r>
+              <a:rPr lang="en-US" dirty="0"/>
+              <a:t>2-class</a:t>
+            </a:r>
+          </a:p>
+        </p:txBody>
+      </p:sp>
       <p:pic>
         <p:nvPicPr>
-          <p:cNvPr id="9" name="Picture 8">
-            <a:extLst>
-              <a:ext uri="{FF2B5EF4-FFF2-40B4-BE49-F238E27FC236}">
-                <a16:creationId xmlns:a16="http://schemas.microsoft.com/office/drawing/2014/main" id="{BBB803DA-48D6-F145-918D-84E2E1266EA4}"/>
+          <p:cNvPr id="7" name="Grafik 6">
+            <a:extLst>
+              <a:ext uri="{FF2B5EF4-FFF2-40B4-BE49-F238E27FC236}">
+                <a16:creationId xmlns:a16="http://schemas.microsoft.com/office/drawing/2014/main" id="{F78ABDC4-A413-4547-8025-C3FDD7E30E30}"/>
               </a:ext>
             </a:extLst>
           </p:cNvPr>
@@ -5401,8 +5436,8 @@
         </p:blipFill>
         <p:spPr>
           <a:xfrm>
-            <a:off x="76200" y="2295525"/>
-            <a:ext cx="6324600" cy="3952875"/>
+            <a:off x="381001" y="2361745"/>
+            <a:ext cx="5638800" cy="3794579"/>
           </a:xfrm>
           <a:prstGeom prst="rect">
             <a:avLst/>
@@ -5411,10 +5446,10 @@
       </p:pic>
       <p:pic>
         <p:nvPicPr>
-          <p:cNvPr id="11" name="Picture 10">
-            <a:extLst>
-              <a:ext uri="{FF2B5EF4-FFF2-40B4-BE49-F238E27FC236}">
-                <a16:creationId xmlns:a16="http://schemas.microsoft.com/office/drawing/2014/main" id="{7EC6C3B8-D027-2749-9E60-0C8C3877A822}"/>
+          <p:cNvPr id="10" name="Grafik 9">
+            <a:extLst>
+              <a:ext uri="{FF2B5EF4-FFF2-40B4-BE49-F238E27FC236}">
+                <a16:creationId xmlns:a16="http://schemas.microsoft.com/office/drawing/2014/main" id="{D303F122-46E6-4BA7-A386-46531D2245B0}"/>
               </a:ext>
             </a:extLst>
           </p:cNvPr>
@@ -5431,49 +5466,14 @@
         </p:blipFill>
         <p:spPr>
           <a:xfrm>
-            <a:off x="6019800" y="4462031"/>
-            <a:ext cx="3124200" cy="1952625"/>
+            <a:off x="5791200" y="4303307"/>
+            <a:ext cx="3276600" cy="2173693"/>
           </a:xfrm>
           <a:prstGeom prst="rect">
             <a:avLst/>
           </a:prstGeom>
         </p:spPr>
       </p:pic>
-      <p:sp>
-        <p:nvSpPr>
-          <p:cNvPr id="12" name="TextBox 11">
-            <a:extLst>
-              <a:ext uri="{FF2B5EF4-FFF2-40B4-BE49-F238E27FC236}">
-                <a16:creationId xmlns:a16="http://schemas.microsoft.com/office/drawing/2014/main" id="{30EADCF1-3CBB-9843-9029-1FCFB3EF1032}"/>
-              </a:ext>
-            </a:extLst>
-          </p:cNvPr>
-          <p:cNvSpPr txBox="1"/>
-          <p:nvPr/>
-        </p:nvSpPr>
-        <p:spPr>
-          <a:xfrm>
-            <a:off x="7964840" y="4237326"/>
-            <a:ext cx="915635" cy="369332"/>
-          </a:xfrm>
-          <a:prstGeom prst="rect">
-            <a:avLst/>
-          </a:prstGeom>
-          <a:noFill/>
-        </p:spPr>
-        <p:txBody>
-          <a:bodyPr wrap="none" rtlCol="0">
-            <a:spAutoFit/>
-          </a:bodyPr>
-          <a:lstStyle/>
-          <a:p>
-            <a:r>
-              <a:rPr lang="en-US" dirty="0"/>
-              <a:t>2-class</a:t>
-            </a:r>
-          </a:p>
-        </p:txBody>
-      </p:sp>
     </p:spTree>
     <p:extLst>
       <p:ext uri="{BB962C8B-B14F-4D97-AF65-F5344CB8AC3E}">
@@ -5840,6 +5840,262 @@
           <p:cNvPr id="2" name="Title 1">
             <a:extLst>
               <a:ext uri="{FF2B5EF4-FFF2-40B4-BE49-F238E27FC236}">
+                <a16:creationId xmlns:a16="http://schemas.microsoft.com/office/drawing/2014/main" id="{AC971962-557B-FF41-A727-C358EAFA39FB}"/>
+              </a:ext>
+            </a:extLst>
+          </p:cNvPr>
+          <p:cNvSpPr>
+            <a:spLocks noGrp="1"/>
+          </p:cNvSpPr>
+          <p:nvPr>
+            <p:ph type="title"/>
+          </p:nvPr>
+        </p:nvSpPr>
+        <p:spPr/>
+        <p:txBody>
+          <a:bodyPr/>
+          <a:lstStyle/>
+          <a:p>
+            <a:r>
+              <a:rPr lang="en-US" dirty="0"/>
+              <a:t>4FGL-DR2 features</a:t>
+            </a:r>
+          </a:p>
+        </p:txBody>
+      </p:sp>
+      <p:sp>
+        <p:nvSpPr>
+          <p:cNvPr id="3" name="Content Placeholder 2">
+            <a:extLst>
+              <a:ext uri="{FF2B5EF4-FFF2-40B4-BE49-F238E27FC236}">
+                <a16:creationId xmlns:a16="http://schemas.microsoft.com/office/drawing/2014/main" id="{6F84EB0B-A0FE-1145-B10D-A7990BD0F22D}"/>
+              </a:ext>
+            </a:extLst>
+          </p:cNvPr>
+          <p:cNvSpPr>
+            <a:spLocks noGrp="1"/>
+          </p:cNvSpPr>
+          <p:nvPr>
+            <p:ph idx="1"/>
+          </p:nvPr>
+        </p:nvSpPr>
+        <p:spPr/>
+        <p:txBody>
+          <a:bodyPr/>
+          <a:lstStyle/>
+          <a:p>
+            <a:r>
+              <a:rPr lang="en-US" dirty="0"/>
+              <a:t>Use 16 features for 4FGL-DR2 instead of 11 for 3FGL</a:t>
+            </a:r>
+          </a:p>
+          <a:p>
+            <a:pPr marL="0" indent="0">
+              <a:buNone/>
+            </a:pPr>
+            <a:endParaRPr lang="en-US" dirty="0"/>
+          </a:p>
+        </p:txBody>
+      </p:sp>
+      <p:sp>
+        <p:nvSpPr>
+          <p:cNvPr id="4" name="Slide Number Placeholder 3">
+            <a:extLst>
+              <a:ext uri="{FF2B5EF4-FFF2-40B4-BE49-F238E27FC236}">
+                <a16:creationId xmlns:a16="http://schemas.microsoft.com/office/drawing/2014/main" id="{C6ED1417-507A-E747-92C8-88DB2E10303A}"/>
+              </a:ext>
+            </a:extLst>
+          </p:cNvPr>
+          <p:cNvSpPr>
+            <a:spLocks noGrp="1"/>
+          </p:cNvSpPr>
+          <p:nvPr>
+            <p:ph type="sldNum" sz="quarter" idx="12"/>
+          </p:nvPr>
+        </p:nvSpPr>
+        <p:spPr/>
+        <p:txBody>
+          <a:bodyPr/>
+          <a:lstStyle/>
+          <a:p>
+            <a:fld id="{2BE1FEC3-8823-1349-926D-AB6C326E7D50}" type="slidenum">
+              <a:rPr lang="en-US" smtClean="0"/>
+              <a:pPr/>
+              <a:t>15</a:t>
+            </a:fld>
+            <a:endParaRPr lang="en-US"/>
+          </a:p>
+        </p:txBody>
+      </p:sp>
+      <p:sp>
+        <p:nvSpPr>
+          <p:cNvPr id="5" name="Footer Placeholder 4">
+            <a:extLst>
+              <a:ext uri="{FF2B5EF4-FFF2-40B4-BE49-F238E27FC236}">
+                <a16:creationId xmlns:a16="http://schemas.microsoft.com/office/drawing/2014/main" id="{4C655BC2-5274-DA4C-90E5-68C85149E8BC}"/>
+              </a:ext>
+            </a:extLst>
+          </p:cNvPr>
+          <p:cNvSpPr>
+            <a:spLocks noGrp="1"/>
+          </p:cNvSpPr>
+          <p:nvPr>
+            <p:ph type="ftr" sz="quarter" idx="3"/>
+          </p:nvPr>
+        </p:nvSpPr>
+        <p:spPr/>
+        <p:txBody>
+          <a:bodyPr/>
+          <a:lstStyle/>
+          <a:p>
+            <a:r>
+              <a:rPr lang="en-US"/>
+              <a:t>Dmitry Malyshev, Probabilistic catalogs</a:t>
+            </a:r>
+            <a:endParaRPr lang="en-US" dirty="0"/>
+          </a:p>
+        </p:txBody>
+      </p:sp>
+      <p:pic>
+        <p:nvPicPr>
+          <p:cNvPr id="9" name="Picture 8" descr="Text&#10;&#10;Description automatically generated with medium confidence">
+            <a:extLst>
+              <a:ext uri="{FF2B5EF4-FFF2-40B4-BE49-F238E27FC236}">
+                <a16:creationId xmlns:a16="http://schemas.microsoft.com/office/drawing/2014/main" id="{6D7B2DFE-9F42-7140-A56C-4933AB12A965}"/>
+              </a:ext>
+            </a:extLst>
+          </p:cNvPr>
+          <p:cNvPicPr>
+            <a:picLocks noChangeAspect="1"/>
+          </p:cNvPicPr>
+          <p:nvPr/>
+        </p:nvPicPr>
+        <p:blipFill>
+          <a:blip r:embed="rId2"/>
+          <a:stretch>
+            <a:fillRect/>
+          </a:stretch>
+        </p:blipFill>
+        <p:spPr>
+          <a:xfrm>
+            <a:off x="914400" y="1898744"/>
+            <a:ext cx="2667000" cy="3701955"/>
+          </a:xfrm>
+          <a:prstGeom prst="rect">
+            <a:avLst/>
+          </a:prstGeom>
+        </p:spPr>
+      </p:pic>
+      <p:pic>
+        <p:nvPicPr>
+          <p:cNvPr id="7" name="Grafik 6" descr="Ein Bild, das Tisch enthält.&#10;&#10;Automatisch generierte Beschreibung">
+            <a:extLst>
+              <a:ext uri="{FF2B5EF4-FFF2-40B4-BE49-F238E27FC236}">
+                <a16:creationId xmlns:a16="http://schemas.microsoft.com/office/drawing/2014/main" id="{D6C80861-8A71-4655-A6B8-36C60C12CDDD}"/>
+              </a:ext>
+            </a:extLst>
+          </p:cNvPr>
+          <p:cNvPicPr>
+            <a:picLocks noChangeAspect="1"/>
+          </p:cNvPicPr>
+          <p:nvPr/>
+        </p:nvPicPr>
+        <p:blipFill>
+          <a:blip r:embed="rId3"/>
+          <a:stretch>
+            <a:fillRect/>
+          </a:stretch>
+        </p:blipFill>
+        <p:spPr>
+          <a:xfrm>
+            <a:off x="4269315" y="1752600"/>
+            <a:ext cx="4877481" cy="3978320"/>
+          </a:xfrm>
+          <a:prstGeom prst="rect">
+            <a:avLst/>
+          </a:prstGeom>
+        </p:spPr>
+      </p:pic>
+      <p:sp>
+        <p:nvSpPr>
+          <p:cNvPr id="8" name="Pfeil: nach rechts 7">
+            <a:extLst>
+              <a:ext uri="{FF2B5EF4-FFF2-40B4-BE49-F238E27FC236}">
+                <a16:creationId xmlns:a16="http://schemas.microsoft.com/office/drawing/2014/main" id="{70A4A1A5-C037-496C-9C85-93D8FBCFE177}"/>
+              </a:ext>
+            </a:extLst>
+          </p:cNvPr>
+          <p:cNvSpPr/>
+          <p:nvPr/>
+        </p:nvSpPr>
+        <p:spPr>
+          <a:xfrm>
+            <a:off x="3870324" y="3352800"/>
+            <a:ext cx="533400" cy="484632"/>
+          </a:xfrm>
+          <a:prstGeom prst="rightArrow">
+            <a:avLst/>
+          </a:prstGeom>
+        </p:spPr>
+        <p:style>
+          <a:lnRef idx="1">
+            <a:schemeClr val="accent1"/>
+          </a:lnRef>
+          <a:fillRef idx="3">
+            <a:schemeClr val="accent1"/>
+          </a:fillRef>
+          <a:effectRef idx="2">
+            <a:schemeClr val="accent1"/>
+          </a:effectRef>
+          <a:fontRef idx="minor">
+            <a:schemeClr val="lt1"/>
+          </a:fontRef>
+        </p:style>
+        <p:txBody>
+          <a:bodyPr rtlCol="0" anchor="ctr"/>
+          <a:lstStyle/>
+          <a:p>
+            <a:pPr algn="ctr"/>
+            <a:endParaRPr lang="en-DE"/>
+          </a:p>
+        </p:txBody>
+      </p:sp>
+    </p:spTree>
+    <p:extLst>
+      <p:ext uri="{BB962C8B-B14F-4D97-AF65-F5344CB8AC3E}">
+        <p14:creationId xmlns:p14="http://schemas.microsoft.com/office/powerpoint/2010/main" val="1040513554"/>
+      </p:ext>
+    </p:extLst>
+  </p:cSld>
+  <p:clrMapOvr>
+    <a:masterClrMapping/>
+  </p:clrMapOvr>
+  <p:transition/>
+</p:sld>
+</file>
+
+<file path=ppt/slides/slide16.xml><?xml version="1.0" encoding="utf-8"?>
+<p:sld xmlns:a="http://schemas.openxmlformats.org/drawingml/2006/main" xmlns:r="http://schemas.openxmlformats.org/officeDocument/2006/relationships" xmlns:p="http://schemas.openxmlformats.org/presentationml/2006/main">
+  <p:cSld>
+    <p:spTree>
+      <p:nvGrpSpPr>
+        <p:cNvPr id="1" name=""/>
+        <p:cNvGrpSpPr/>
+        <p:nvPr/>
+      </p:nvGrpSpPr>
+      <p:grpSpPr>
+        <a:xfrm>
+          <a:off x="0" y="0"/>
+          <a:ext cx="0" cy="0"/>
+          <a:chOff x="0" y="0"/>
+          <a:chExt cx="0" cy="0"/>
+        </a:xfrm>
+      </p:grpSpPr>
+      <p:sp>
+        <p:nvSpPr>
+          <p:cNvPr id="2" name="Title 1">
+            <a:extLst>
+              <a:ext uri="{FF2B5EF4-FFF2-40B4-BE49-F238E27FC236}">
                 <a16:creationId xmlns:a16="http://schemas.microsoft.com/office/drawing/2014/main" id="{EE40F017-1BE8-AE40-8056-BC484B767BBA}"/>
               </a:ext>
             </a:extLst>
@@ -5891,12 +6147,6 @@
           <a:p>
             <a:r>
               <a:rPr lang="en-US" dirty="0"/>
-              <a:t>Use 16 features for 4FGL-DR2 instead of 11 for 3FGL</a:t>
-            </a:r>
-          </a:p>
-          <a:p>
-            <a:r>
-              <a:rPr lang="en-US" dirty="0"/>
               <a:t>Use the same meta-parameters for RF, BDT, LR algorithms</a:t>
             </a:r>
           </a:p>
@@ -5959,7 +6209,7 @@
             <a:fld id="{2BE1FEC3-8823-1349-926D-AB6C326E7D50}" type="slidenum">
               <a:rPr lang="en-US" smtClean="0"/>
               <a:pPr/>
-              <a:t>15</a:t>
+              <a:t>16</a:t>
             </a:fld>
             <a:endParaRPr lang="en-US"/>
           </a:p>
@@ -6008,7 +6258,7 @@
         </p:nvGrpSpPr>
         <p:grpSpPr>
           <a:xfrm>
-            <a:off x="393700" y="3238500"/>
+            <a:off x="393700" y="3319226"/>
             <a:ext cx="8540172" cy="3023632"/>
             <a:chOff x="393700" y="2945368"/>
             <a:chExt cx="8540172" cy="3023632"/>
@@ -6159,7 +6409,7 @@
 </p:sld>
 </file>
 
-<file path=ppt/slides/slide16.xml><?xml version="1.0" encoding="utf-8"?>
+<file path=ppt/slides/slide17.xml><?xml version="1.0" encoding="utf-8"?>
 <p:sld xmlns:a="http://schemas.openxmlformats.org/drawingml/2006/main" xmlns:r="http://schemas.openxmlformats.org/officeDocument/2006/relationships" xmlns:p="http://schemas.openxmlformats.org/presentationml/2006/main">
   <p:cSld>
     <p:spTree>
@@ -6315,7 +6565,7 @@
             <a:fld id="{2BE1FEC3-8823-1349-926D-AB6C326E7D50}" type="slidenum">
               <a:rPr lang="en-US" smtClean="0"/>
               <a:pPr/>
-              <a:t>16</a:t>
+              <a:t>17</a:t>
             </a:fld>
             <a:endParaRPr lang="en-US"/>
           </a:p>
@@ -6555,7 +6805,7 @@
 </p:sld>
 </file>
 
-<file path=ppt/slides/slide17.xml><?xml version="1.0" encoding="utf-8"?>
+<file path=ppt/slides/slide18.xml><?xml version="1.0" encoding="utf-8"?>
 <p:sld xmlns:a="http://schemas.openxmlformats.org/drawingml/2006/main" xmlns:r="http://schemas.openxmlformats.org/officeDocument/2006/relationships" xmlns:p="http://schemas.openxmlformats.org/presentationml/2006/main">
   <p:cSld>
     <p:spTree>
@@ -6696,7 +6946,7 @@
             <a:fld id="{2BE1FEC3-8823-1349-926D-AB6C326E7D50}" type="slidenum">
               <a:rPr lang="en-US" smtClean="0"/>
               <a:pPr/>
-              <a:t>17</a:t>
+              <a:t>18</a:t>
             </a:fld>
             <a:endParaRPr lang="en-US"/>
           </a:p>
@@ -6805,7 +7055,7 @@
 </p:sld>
 </file>
 
-<file path=ppt/slides/slide18.xml><?xml version="1.0" encoding="utf-8"?>
+<file path=ppt/slides/slide19.xml><?xml version="1.0" encoding="utf-8"?>
 <p:sld xmlns:a="http://schemas.openxmlformats.org/drawingml/2006/main" xmlns:r="http://schemas.openxmlformats.org/officeDocument/2006/relationships" xmlns:p="http://schemas.openxmlformats.org/presentationml/2006/main">
   <p:cSld>
     <p:spTree>
@@ -7041,7 +7291,7 @@
             <a:fld id="{2BE1FEC3-8823-1349-926D-AB6C326E7D50}" type="slidenum">
               <a:rPr lang="en-US" smtClean="0"/>
               <a:pPr/>
-              <a:t>18</a:t>
+              <a:t>19</a:t>
             </a:fld>
             <a:endParaRPr lang="en-US"/>
           </a:p>
@@ -7298,7 +7548,7 @@
 </p:sld>
 </file>
 
-<file path=ppt/slides/slide19.xml><?xml version="1.0" encoding="utf-8"?>
+<file path=ppt/slides/slide2.xml><?xml version="1.0" encoding="utf-8"?>
 <p:sld xmlns:a="http://schemas.openxmlformats.org/drawingml/2006/main" xmlns:r="http://schemas.openxmlformats.org/officeDocument/2006/relationships" xmlns:p="http://schemas.openxmlformats.org/presentationml/2006/main">
   <p:cSld>
     <p:spTree>
@@ -7317,13 +7567,7 @@
       </p:grpSpPr>
       <p:sp>
         <p:nvSpPr>
-          <p:cNvPr id="2" name="Title 1">
-            <a:extLst>
-              <a:ext uri="{FF2B5EF4-FFF2-40B4-BE49-F238E27FC236}">
-                <a16:creationId xmlns:a16="http://schemas.microsoft.com/office/drawing/2014/main" id="{31B8F291-9AE2-F849-8F95-410E97105E0B}"/>
-              </a:ext>
-            </a:extLst>
-          </p:cNvPr>
+          <p:cNvPr id="2" name="Title 1"/>
           <p:cNvSpPr>
             <a:spLocks noGrp="1"/>
           </p:cNvSpPr>
@@ -7338,20 +7582,14 @@
           <a:p>
             <a:r>
               <a:rPr lang="en-US" dirty="0"/>
-              <a:t>N(S) in the 3-class classification</a:t>
-            </a:r>
-          </a:p>
-        </p:txBody>
-      </p:sp>
-      <p:sp>
-        <p:nvSpPr>
-          <p:cNvPr id="3" name="Content Placeholder 2">
-            <a:extLst>
-              <a:ext uri="{FF2B5EF4-FFF2-40B4-BE49-F238E27FC236}">
-                <a16:creationId xmlns:a16="http://schemas.microsoft.com/office/drawing/2014/main" id="{9035AC93-8E8B-0845-ADD6-148C5A8FACB7}"/>
-              </a:ext>
-            </a:extLst>
-          </p:cNvPr>
+              <a:t>Plan</a:t>
+            </a:r>
+          </a:p>
+        </p:txBody>
+      </p:sp>
+      <p:sp>
+        <p:nvSpPr>
+          <p:cNvPr id="3" name="Content Placeholder 2"/>
           <p:cNvSpPr>
             <a:spLocks noGrp="1"/>
           </p:cNvSpPr>
@@ -7366,27 +7604,66 @@
           <a:p>
             <a:r>
               <a:rPr lang="en-US" dirty="0"/>
-              <a:t>The predicted number of pulsars among unassociated 3FGL sources in the 3-class case is significantly below the predictions in the 2-class case (even after corrections for other sources).</a:t>
+              <a:t>Motivation</a:t>
+            </a:r>
+          </a:p>
+          <a:p>
+            <a:r>
+              <a:rPr lang="en-US" dirty="0"/>
+              <a:t>Construction of a probabilistic catalog from the Fermi LAT 3FGL catalog</a:t>
             </a:r>
           </a:p>
           <a:p>
             <a:pPr lvl="1"/>
             <a:r>
               <a:rPr lang="en-US" dirty="0"/>
-              <a:t>red band is below the orange one:</a:t>
-            </a:r>
-          </a:p>
-        </p:txBody>
-      </p:sp>
-      <p:sp>
-        <p:nvSpPr>
-          <p:cNvPr id="4" name="Slide Number Placeholder 3">
-            <a:extLst>
-              <a:ext uri="{FF2B5EF4-FFF2-40B4-BE49-F238E27FC236}">
-                <a16:creationId xmlns:a16="http://schemas.microsoft.com/office/drawing/2014/main" id="{4D815511-623E-B243-9CFD-A3640533F397}"/>
-              </a:ext>
-            </a:extLst>
-          </p:cNvPr>
+              <a:t>Features</a:t>
+            </a:r>
+          </a:p>
+          <a:p>
+            <a:pPr lvl="1"/>
+            <a:r>
+              <a:rPr lang="en-US" dirty="0"/>
+              <a:t>Meta-parameters</a:t>
+            </a:r>
+          </a:p>
+          <a:p>
+            <a:pPr lvl="1"/>
+            <a:r>
+              <a:rPr lang="en-US" dirty="0"/>
+              <a:t>Oversampling</a:t>
+            </a:r>
+          </a:p>
+          <a:p>
+            <a:pPr lvl="1"/>
+            <a:r>
+              <a:rPr lang="en-US" dirty="0"/>
+              <a:t>2-class vs 3-class classification</a:t>
+            </a:r>
+          </a:p>
+          <a:p>
+            <a:r>
+              <a:rPr lang="en-US" dirty="0"/>
+              <a:t>Comparison of unassociated sources in 3FGL with sources in 4FGL-DR2</a:t>
+            </a:r>
+          </a:p>
+          <a:p>
+            <a:r>
+              <a:rPr lang="en-US" dirty="0"/>
+              <a:t>Probabilistic catalog based on 4FGL-DR2</a:t>
+            </a:r>
+          </a:p>
+          <a:p>
+            <a:r>
+              <a:rPr lang="en-US" dirty="0"/>
+              <a:t>Example of the usage of probabilistic catalogs for population studies</a:t>
+            </a:r>
+          </a:p>
+        </p:txBody>
+      </p:sp>
+      <p:sp>
+        <p:nvSpPr>
+          <p:cNvPr id="4" name="Slide Number Placeholder 3"/>
           <p:cNvSpPr>
             <a:spLocks noGrp="1"/>
           </p:cNvSpPr>
@@ -7402,7 +7679,154 @@
             <a:fld id="{2BE1FEC3-8823-1349-926D-AB6C326E7D50}" type="slidenum">
               <a:rPr lang="en-US" smtClean="0"/>
               <a:pPr/>
-              <a:t>19</a:t>
+              <a:t>2</a:t>
+            </a:fld>
+            <a:endParaRPr lang="en-US"/>
+          </a:p>
+        </p:txBody>
+      </p:sp>
+      <p:sp>
+        <p:nvSpPr>
+          <p:cNvPr id="6" name="Footer Placeholder 5"/>
+          <p:cNvSpPr>
+            <a:spLocks noGrp="1"/>
+          </p:cNvSpPr>
+          <p:nvPr>
+            <p:ph type="ftr" sz="quarter" idx="3"/>
+          </p:nvPr>
+        </p:nvSpPr>
+        <p:spPr/>
+        <p:txBody>
+          <a:bodyPr/>
+          <a:lstStyle/>
+          <a:p>
+            <a:r>
+              <a:rPr lang="en-US"/>
+              <a:t>Dmitry Malyshev, Probabilistic catalogs</a:t>
+            </a:r>
+            <a:endParaRPr lang="en-US" dirty="0"/>
+          </a:p>
+        </p:txBody>
+      </p:sp>
+    </p:spTree>
+    <p:extLst>
+      <p:ext uri="{BB962C8B-B14F-4D97-AF65-F5344CB8AC3E}">
+        <p14:creationId xmlns:p14="http://schemas.microsoft.com/office/powerpoint/2010/main" val="747983871"/>
+      </p:ext>
+    </p:extLst>
+  </p:cSld>
+  <p:clrMapOvr>
+    <a:masterClrMapping/>
+  </p:clrMapOvr>
+  <p:transition/>
+</p:sld>
+</file>
+
+<file path=ppt/slides/slide20.xml><?xml version="1.0" encoding="utf-8"?>
+<p:sld xmlns:a="http://schemas.openxmlformats.org/drawingml/2006/main" xmlns:r="http://schemas.openxmlformats.org/officeDocument/2006/relationships" xmlns:p="http://schemas.openxmlformats.org/presentationml/2006/main">
+  <p:cSld>
+    <p:spTree>
+      <p:nvGrpSpPr>
+        <p:cNvPr id="1" name=""/>
+        <p:cNvGrpSpPr/>
+        <p:nvPr/>
+      </p:nvGrpSpPr>
+      <p:grpSpPr>
+        <a:xfrm>
+          <a:off x="0" y="0"/>
+          <a:ext cx="0" cy="0"/>
+          <a:chOff x="0" y="0"/>
+          <a:chExt cx="0" cy="0"/>
+        </a:xfrm>
+      </p:grpSpPr>
+      <p:sp>
+        <p:nvSpPr>
+          <p:cNvPr id="2" name="Title 1">
+            <a:extLst>
+              <a:ext uri="{FF2B5EF4-FFF2-40B4-BE49-F238E27FC236}">
+                <a16:creationId xmlns:a16="http://schemas.microsoft.com/office/drawing/2014/main" id="{31B8F291-9AE2-F849-8F95-410E97105E0B}"/>
+              </a:ext>
+            </a:extLst>
+          </p:cNvPr>
+          <p:cNvSpPr>
+            <a:spLocks noGrp="1"/>
+          </p:cNvSpPr>
+          <p:nvPr>
+            <p:ph type="title"/>
+          </p:nvPr>
+        </p:nvSpPr>
+        <p:spPr/>
+        <p:txBody>
+          <a:bodyPr/>
+          <a:lstStyle/>
+          <a:p>
+            <a:r>
+              <a:rPr lang="en-US" dirty="0"/>
+              <a:t>N(S) in the 3-class classification</a:t>
+            </a:r>
+          </a:p>
+        </p:txBody>
+      </p:sp>
+      <p:sp>
+        <p:nvSpPr>
+          <p:cNvPr id="3" name="Content Placeholder 2">
+            <a:extLst>
+              <a:ext uri="{FF2B5EF4-FFF2-40B4-BE49-F238E27FC236}">
+                <a16:creationId xmlns:a16="http://schemas.microsoft.com/office/drawing/2014/main" id="{9035AC93-8E8B-0845-ADD6-148C5A8FACB7}"/>
+              </a:ext>
+            </a:extLst>
+          </p:cNvPr>
+          <p:cNvSpPr>
+            <a:spLocks noGrp="1"/>
+          </p:cNvSpPr>
+          <p:nvPr>
+            <p:ph idx="1"/>
+          </p:nvPr>
+        </p:nvSpPr>
+        <p:spPr/>
+        <p:txBody>
+          <a:bodyPr/>
+          <a:lstStyle/>
+          <a:p>
+            <a:r>
+              <a:rPr lang="en-US" dirty="0"/>
+              <a:t>The predicted number of pulsars among unassociated 3FGL sources in the 3-class case is significantly below the predictions in the 2-class case (even after corrections for other sources).</a:t>
+            </a:r>
+          </a:p>
+          <a:p>
+            <a:pPr lvl="1"/>
+            <a:r>
+              <a:rPr lang="en-US" dirty="0"/>
+              <a:t>red band is below the orange one:</a:t>
+            </a:r>
+          </a:p>
+        </p:txBody>
+      </p:sp>
+      <p:sp>
+        <p:nvSpPr>
+          <p:cNvPr id="4" name="Slide Number Placeholder 3">
+            <a:extLst>
+              <a:ext uri="{FF2B5EF4-FFF2-40B4-BE49-F238E27FC236}">
+                <a16:creationId xmlns:a16="http://schemas.microsoft.com/office/drawing/2014/main" id="{4D815511-623E-B243-9CFD-A3640533F397}"/>
+              </a:ext>
+            </a:extLst>
+          </p:cNvPr>
+          <p:cNvSpPr>
+            <a:spLocks noGrp="1"/>
+          </p:cNvSpPr>
+          <p:nvPr>
+            <p:ph type="sldNum" sz="quarter" idx="12"/>
+          </p:nvPr>
+        </p:nvSpPr>
+        <p:spPr/>
+        <p:txBody>
+          <a:bodyPr/>
+          <a:lstStyle/>
+          <a:p>
+            <a:fld id="{2BE1FEC3-8823-1349-926D-AB6C326E7D50}" type="slidenum">
+              <a:rPr lang="en-US" smtClean="0"/>
+              <a:pPr/>
+              <a:t>20</a:t>
             </a:fld>
             <a:endParaRPr lang="en-US"/>
           </a:p>
@@ -7481,7 +7905,7 @@
 </p:sld>
 </file>
 
-<file path=ppt/slides/slide2.xml><?xml version="1.0" encoding="utf-8"?>
+<file path=ppt/slides/slide21.xml><?xml version="1.0" encoding="utf-8"?>
 <p:sld xmlns:a="http://schemas.openxmlformats.org/drawingml/2006/main" xmlns:r="http://schemas.openxmlformats.org/officeDocument/2006/relationships" xmlns:p="http://schemas.openxmlformats.org/presentationml/2006/main">
   <p:cSld>
     <p:spTree>
@@ -7500,7 +7924,13 @@
       </p:grpSpPr>
       <p:sp>
         <p:nvSpPr>
-          <p:cNvPr id="2" name="Title 1"/>
+          <p:cNvPr id="2" name="Title 1">
+            <a:extLst>
+              <a:ext uri="{FF2B5EF4-FFF2-40B4-BE49-F238E27FC236}">
+                <a16:creationId xmlns:a16="http://schemas.microsoft.com/office/drawing/2014/main" id="{6386259A-C37F-A745-A0F5-F7575CAC1746}"/>
+              </a:ext>
+            </a:extLst>
+          </p:cNvPr>
           <p:cNvSpPr>
             <a:spLocks noGrp="1"/>
           </p:cNvSpPr>
@@ -7515,14 +7945,20 @@
           <a:p>
             <a:r>
               <a:rPr lang="en-US" dirty="0"/>
-              <a:t>Plan</a:t>
-            </a:r>
-          </a:p>
-        </p:txBody>
-      </p:sp>
-      <p:sp>
-        <p:nvSpPr>
-          <p:cNvPr id="3" name="Content Placeholder 2"/>
+              <a:t>Latitude profiles</a:t>
+            </a:r>
+          </a:p>
+        </p:txBody>
+      </p:sp>
+      <p:sp>
+        <p:nvSpPr>
+          <p:cNvPr id="3" name="Content Placeholder 2">
+            <a:extLst>
+              <a:ext uri="{FF2B5EF4-FFF2-40B4-BE49-F238E27FC236}">
+                <a16:creationId xmlns:a16="http://schemas.microsoft.com/office/drawing/2014/main" id="{C0274DCC-8D16-7740-B195-FB9D370DA58E}"/>
+              </a:ext>
+            </a:extLst>
+          </p:cNvPr>
           <p:cNvSpPr>
             <a:spLocks noGrp="1"/>
           </p:cNvSpPr>
@@ -7537,66 +7973,109 @@
           <a:p>
             <a:r>
               <a:rPr lang="en-US" dirty="0"/>
-              <a:t>Motivation</a:t>
-            </a:r>
-          </a:p>
-          <a:p>
-            <a:r>
-              <a:rPr lang="en-US" dirty="0"/>
-              <a:t>Construction of a probabilistic catalog from the Fermi LAT 3FGL catalog</a:t>
-            </a:r>
-          </a:p>
-          <a:p>
-            <a:pPr lvl="1"/>
-            <a:r>
-              <a:rPr lang="en-US" dirty="0"/>
-              <a:t>Features</a:t>
-            </a:r>
-          </a:p>
-          <a:p>
-            <a:pPr lvl="1"/>
-            <a:r>
-              <a:rPr lang="en-US" dirty="0"/>
-              <a:t>Meta-parameters</a:t>
-            </a:r>
-          </a:p>
-          <a:p>
-            <a:pPr lvl="1"/>
-            <a:r>
-              <a:rPr lang="en-US" dirty="0"/>
-              <a:t>oversampling</a:t>
-            </a:r>
-          </a:p>
-          <a:p>
-            <a:pPr lvl="1"/>
-            <a:r>
-              <a:rPr lang="en-US" dirty="0"/>
-              <a:t>2-class vs 3-class classification</a:t>
-            </a:r>
-          </a:p>
-          <a:p>
-            <a:r>
-              <a:rPr lang="en-US" dirty="0"/>
-              <a:t>Comparison of unassociated sources in 3FGL with sources in 4FGL-DR2</a:t>
-            </a:r>
-          </a:p>
-          <a:p>
-            <a:r>
-              <a:rPr lang="en-US" dirty="0"/>
-              <a:t>Probabilistic catalog based on 4FGL-DR2</a:t>
-            </a:r>
-          </a:p>
-          <a:p>
-            <a:r>
-              <a:rPr lang="en-US" dirty="0"/>
-              <a:t>Example of the usage of probabilistic catalogs for population studies</a:t>
-            </a:r>
-          </a:p>
-        </p:txBody>
-      </p:sp>
-      <p:sp>
-        <p:nvSpPr>
-          <p:cNvPr id="4" name="Slide Number Placeholder 3"/>
+              <a:t>For AGNs, the count of associated sources (and also the sum of AGN probabilities for associated sources) decreases towards the Galactic plane</a:t>
+            </a:r>
+          </a:p>
+          <a:p>
+            <a:r>
+              <a:rPr lang="en-US" dirty="0"/>
+              <a:t>However, one</a:t>
+            </a:r>
+            <a:br>
+              <a:rPr lang="en-US" dirty="0"/>
+            </a:br>
+            <a:r>
+              <a:rPr lang="en-US" dirty="0"/>
+              <a:t>expects that</a:t>
+            </a:r>
+            <a:br>
+              <a:rPr lang="en-US" dirty="0"/>
+            </a:br>
+            <a:r>
+              <a:rPr lang="en-US" dirty="0"/>
+              <a:t>the distribution</a:t>
+            </a:r>
+            <a:br>
+              <a:rPr lang="en-US" dirty="0"/>
+            </a:br>
+            <a:r>
+              <a:rPr lang="en-US" dirty="0"/>
+              <a:t>of AGNs should</a:t>
+            </a:r>
+            <a:br>
+              <a:rPr lang="en-US" dirty="0"/>
+            </a:br>
+            <a:r>
+              <a:rPr lang="en-US" dirty="0"/>
+              <a:t>be isotropic</a:t>
+            </a:r>
+          </a:p>
+          <a:p>
+            <a:r>
+              <a:rPr lang="en-US" dirty="0"/>
+              <a:t>The sum of </a:t>
+            </a:r>
+            <a:br>
+              <a:rPr lang="en-US" dirty="0"/>
+            </a:br>
+            <a:r>
+              <a:rPr lang="en-US" dirty="0"/>
+              <a:t>AGN probabilities</a:t>
+            </a:r>
+            <a:br>
+              <a:rPr lang="en-US" dirty="0"/>
+            </a:br>
+            <a:r>
+              <a:rPr lang="en-US" dirty="0"/>
+              <a:t>over unassociated</a:t>
+            </a:r>
+            <a:br>
+              <a:rPr lang="en-US" dirty="0"/>
+            </a:br>
+            <a:r>
+              <a:rPr lang="en-US" dirty="0"/>
+              <a:t>sources is increasing</a:t>
+            </a:r>
+            <a:br>
+              <a:rPr lang="en-US" dirty="0"/>
+            </a:br>
+            <a:r>
+              <a:rPr lang="en-US" dirty="0"/>
+              <a:t>towards the Galactic</a:t>
+            </a:r>
+            <a:br>
+              <a:rPr lang="en-US" dirty="0"/>
+            </a:br>
+            <a:r>
+              <a:rPr lang="en-US" dirty="0"/>
+              <a:t>plane, so that the total</a:t>
+            </a:r>
+            <a:br>
+              <a:rPr lang="en-US" dirty="0"/>
+            </a:br>
+            <a:r>
+              <a:rPr lang="en-US" dirty="0"/>
+              <a:t>expected number is</a:t>
+            </a:r>
+            <a:br>
+              <a:rPr lang="en-US" dirty="0"/>
+            </a:br>
+            <a:r>
+              <a:rPr lang="en-US" dirty="0"/>
+              <a:t>approximately isotropic</a:t>
+            </a:r>
+          </a:p>
+        </p:txBody>
+      </p:sp>
+      <p:sp>
+        <p:nvSpPr>
+          <p:cNvPr id="4" name="Slide Number Placeholder 3">
+            <a:extLst>
+              <a:ext uri="{FF2B5EF4-FFF2-40B4-BE49-F238E27FC236}">
+                <a16:creationId xmlns:a16="http://schemas.microsoft.com/office/drawing/2014/main" id="{166FDD86-FCAC-754F-9CA7-F1B24D675B88}"/>
+              </a:ext>
+            </a:extLst>
+          </p:cNvPr>
           <p:cNvSpPr>
             <a:spLocks noGrp="1"/>
           </p:cNvSpPr>
@@ -7612,236 +8091,7 @@
             <a:fld id="{2BE1FEC3-8823-1349-926D-AB6C326E7D50}" type="slidenum">
               <a:rPr lang="en-US" smtClean="0"/>
               <a:pPr/>
-              <a:t>2</a:t>
-            </a:fld>
-            <a:endParaRPr lang="en-US"/>
-          </a:p>
-        </p:txBody>
-      </p:sp>
-      <p:sp>
-        <p:nvSpPr>
-          <p:cNvPr id="6" name="Footer Placeholder 5"/>
-          <p:cNvSpPr>
-            <a:spLocks noGrp="1"/>
-          </p:cNvSpPr>
-          <p:nvPr>
-            <p:ph type="ftr" sz="quarter" idx="3"/>
-          </p:nvPr>
-        </p:nvSpPr>
-        <p:spPr/>
-        <p:txBody>
-          <a:bodyPr/>
-          <a:lstStyle/>
-          <a:p>
-            <a:r>
-              <a:rPr lang="en-US"/>
-              <a:t>Dmitry Malyshev, Probabilistic catalogs</a:t>
-            </a:r>
-            <a:endParaRPr lang="en-US" dirty="0"/>
-          </a:p>
-        </p:txBody>
-      </p:sp>
-    </p:spTree>
-    <p:extLst>
-      <p:ext uri="{BB962C8B-B14F-4D97-AF65-F5344CB8AC3E}">
-        <p14:creationId xmlns:p14="http://schemas.microsoft.com/office/powerpoint/2010/main" val="747983871"/>
-      </p:ext>
-    </p:extLst>
-  </p:cSld>
-  <p:clrMapOvr>
-    <a:masterClrMapping/>
-  </p:clrMapOvr>
-  <p:transition/>
-</p:sld>
-</file>
-
-<file path=ppt/slides/slide20.xml><?xml version="1.0" encoding="utf-8"?>
-<p:sld xmlns:a="http://schemas.openxmlformats.org/drawingml/2006/main" xmlns:r="http://schemas.openxmlformats.org/officeDocument/2006/relationships" xmlns:p="http://schemas.openxmlformats.org/presentationml/2006/main">
-  <p:cSld>
-    <p:spTree>
-      <p:nvGrpSpPr>
-        <p:cNvPr id="1" name=""/>
-        <p:cNvGrpSpPr/>
-        <p:nvPr/>
-      </p:nvGrpSpPr>
-      <p:grpSpPr>
-        <a:xfrm>
-          <a:off x="0" y="0"/>
-          <a:ext cx="0" cy="0"/>
-          <a:chOff x="0" y="0"/>
-          <a:chExt cx="0" cy="0"/>
-        </a:xfrm>
-      </p:grpSpPr>
-      <p:sp>
-        <p:nvSpPr>
-          <p:cNvPr id="2" name="Title 1">
-            <a:extLst>
-              <a:ext uri="{FF2B5EF4-FFF2-40B4-BE49-F238E27FC236}">
-                <a16:creationId xmlns:a16="http://schemas.microsoft.com/office/drawing/2014/main" id="{6386259A-C37F-A745-A0F5-F7575CAC1746}"/>
-              </a:ext>
-            </a:extLst>
-          </p:cNvPr>
-          <p:cNvSpPr>
-            <a:spLocks noGrp="1"/>
-          </p:cNvSpPr>
-          <p:nvPr>
-            <p:ph type="title"/>
-          </p:nvPr>
-        </p:nvSpPr>
-        <p:spPr/>
-        <p:txBody>
-          <a:bodyPr/>
-          <a:lstStyle/>
-          <a:p>
-            <a:r>
-              <a:rPr lang="en-US" dirty="0"/>
-              <a:t>Latitude profiles</a:t>
-            </a:r>
-          </a:p>
-        </p:txBody>
-      </p:sp>
-      <p:sp>
-        <p:nvSpPr>
-          <p:cNvPr id="3" name="Content Placeholder 2">
-            <a:extLst>
-              <a:ext uri="{FF2B5EF4-FFF2-40B4-BE49-F238E27FC236}">
-                <a16:creationId xmlns:a16="http://schemas.microsoft.com/office/drawing/2014/main" id="{C0274DCC-8D16-7740-B195-FB9D370DA58E}"/>
-              </a:ext>
-            </a:extLst>
-          </p:cNvPr>
-          <p:cNvSpPr>
-            <a:spLocks noGrp="1"/>
-          </p:cNvSpPr>
-          <p:nvPr>
-            <p:ph idx="1"/>
-          </p:nvPr>
-        </p:nvSpPr>
-        <p:spPr/>
-        <p:txBody>
-          <a:bodyPr/>
-          <a:lstStyle/>
-          <a:p>
-            <a:r>
-              <a:rPr lang="en-US" dirty="0"/>
-              <a:t>For AGNs, the count of associated sources (and also the sum of AGN probabilities for associated sources) decreases towards the Galactic plane</a:t>
-            </a:r>
-          </a:p>
-          <a:p>
-            <a:r>
-              <a:rPr lang="en-US" dirty="0"/>
-              <a:t>However, one</a:t>
-            </a:r>
-            <a:br>
-              <a:rPr lang="en-US" dirty="0"/>
-            </a:br>
-            <a:r>
-              <a:rPr lang="en-US" dirty="0"/>
-              <a:t>expects that</a:t>
-            </a:r>
-            <a:br>
-              <a:rPr lang="en-US" dirty="0"/>
-            </a:br>
-            <a:r>
-              <a:rPr lang="en-US" dirty="0"/>
-              <a:t>the distribution</a:t>
-            </a:r>
-            <a:br>
-              <a:rPr lang="en-US" dirty="0"/>
-            </a:br>
-            <a:r>
-              <a:rPr lang="en-US" dirty="0"/>
-              <a:t>of AGNs should</a:t>
-            </a:r>
-            <a:br>
-              <a:rPr lang="en-US" dirty="0"/>
-            </a:br>
-            <a:r>
-              <a:rPr lang="en-US" dirty="0"/>
-              <a:t>be isotropic</a:t>
-            </a:r>
-          </a:p>
-          <a:p>
-            <a:r>
-              <a:rPr lang="en-US" dirty="0"/>
-              <a:t>The sum of </a:t>
-            </a:r>
-            <a:br>
-              <a:rPr lang="en-US" dirty="0"/>
-            </a:br>
-            <a:r>
-              <a:rPr lang="en-US" dirty="0"/>
-              <a:t>AGN probabilities</a:t>
-            </a:r>
-            <a:br>
-              <a:rPr lang="en-US" dirty="0"/>
-            </a:br>
-            <a:r>
-              <a:rPr lang="en-US" dirty="0"/>
-              <a:t>over unassociated</a:t>
-            </a:r>
-            <a:br>
-              <a:rPr lang="en-US" dirty="0"/>
-            </a:br>
-            <a:r>
-              <a:rPr lang="en-US" dirty="0"/>
-              <a:t>sources is increasing</a:t>
-            </a:r>
-            <a:br>
-              <a:rPr lang="en-US" dirty="0"/>
-            </a:br>
-            <a:r>
-              <a:rPr lang="en-US" dirty="0"/>
-              <a:t>towards the Galactic</a:t>
-            </a:r>
-            <a:br>
-              <a:rPr lang="en-US" dirty="0"/>
-            </a:br>
-            <a:r>
-              <a:rPr lang="en-US" dirty="0"/>
-              <a:t>plane, so that the total</a:t>
-            </a:r>
-            <a:br>
-              <a:rPr lang="en-US" dirty="0"/>
-            </a:br>
-            <a:r>
-              <a:rPr lang="en-US" dirty="0"/>
-              <a:t>expected number is</a:t>
-            </a:r>
-            <a:br>
-              <a:rPr lang="en-US" dirty="0"/>
-            </a:br>
-            <a:r>
-              <a:rPr lang="en-US" dirty="0"/>
-              <a:t>approximately isotropic</a:t>
-            </a:r>
-          </a:p>
-        </p:txBody>
-      </p:sp>
-      <p:sp>
-        <p:nvSpPr>
-          <p:cNvPr id="4" name="Slide Number Placeholder 3">
-            <a:extLst>
-              <a:ext uri="{FF2B5EF4-FFF2-40B4-BE49-F238E27FC236}">
-                <a16:creationId xmlns:a16="http://schemas.microsoft.com/office/drawing/2014/main" id="{166FDD86-FCAC-754F-9CA7-F1B24D675B88}"/>
-              </a:ext>
-            </a:extLst>
-          </p:cNvPr>
-          <p:cNvSpPr>
-            <a:spLocks noGrp="1"/>
-          </p:cNvSpPr>
-          <p:nvPr>
-            <p:ph type="sldNum" sz="quarter" idx="12"/>
-          </p:nvPr>
-        </p:nvSpPr>
-        <p:spPr/>
-        <p:txBody>
-          <a:bodyPr/>
-          <a:lstStyle/>
-          <a:p>
-            <a:fld id="{2BE1FEC3-8823-1349-926D-AB6C326E7D50}" type="slidenum">
-              <a:rPr lang="en-US" smtClean="0"/>
-              <a:pPr/>
-              <a:t>20</a:t>
+              <a:t>21</a:t>
             </a:fld>
             <a:endParaRPr lang="en-US"/>
           </a:p>
@@ -7920,7 +8170,7 @@
 </p:sld>
 </file>
 
-<file path=ppt/slides/slide21.xml><?xml version="1.0" encoding="utf-8"?>
+<file path=ppt/slides/slide22.xml><?xml version="1.0" encoding="utf-8"?>
 <p:sld xmlns:a="http://schemas.openxmlformats.org/drawingml/2006/main" xmlns:r="http://schemas.openxmlformats.org/officeDocument/2006/relationships" xmlns:p="http://schemas.openxmlformats.org/presentationml/2006/main">
   <p:cSld>
     <p:spTree>
@@ -8095,7 +8345,7 @@
             <a:fld id="{2BE1FEC3-8823-1349-926D-AB6C326E7D50}" type="slidenum">
               <a:rPr lang="en-US" smtClean="0"/>
               <a:pPr/>
-              <a:t>21</a:t>
+              <a:t>22</a:t>
             </a:fld>
             <a:endParaRPr lang="en-US"/>
           </a:p>
@@ -8204,7 +8454,7 @@
 </p:sld>
 </file>
 
-<file path=ppt/slides/slide22.xml><?xml version="1.0" encoding="utf-8"?>
+<file path=ppt/slides/slide23.xml><?xml version="1.0" encoding="utf-8"?>
 <p:sld xmlns:a="http://schemas.openxmlformats.org/drawingml/2006/main" xmlns:r="http://schemas.openxmlformats.org/officeDocument/2006/relationships" xmlns:p="http://schemas.openxmlformats.org/presentationml/2006/main">
   <p:cSld>
     <p:spTree>
@@ -8306,7 +8556,7 @@
             <a:fld id="{2BE1FEC3-8823-1349-926D-AB6C326E7D50}" type="slidenum">
               <a:rPr lang="en-US" smtClean="0"/>
               <a:pPr/>
-              <a:t>22</a:t>
+              <a:t>23</a:t>
             </a:fld>
             <a:endParaRPr lang="en-US"/>
           </a:p>
@@ -8506,179 +8756,6 @@
 </p:sld>
 </file>
 
-<file path=ppt/slides/slide23.xml><?xml version="1.0" encoding="utf-8"?>
-<p:sld xmlns:a="http://schemas.openxmlformats.org/drawingml/2006/main" xmlns:r="http://schemas.openxmlformats.org/officeDocument/2006/relationships" xmlns:p="http://schemas.openxmlformats.org/presentationml/2006/main">
-  <p:cSld>
-    <p:spTree>
-      <p:nvGrpSpPr>
-        <p:cNvPr id="1" name=""/>
-        <p:cNvGrpSpPr/>
-        <p:nvPr/>
-      </p:nvGrpSpPr>
-      <p:grpSpPr>
-        <a:xfrm>
-          <a:off x="0" y="0"/>
-          <a:ext cx="0" cy="0"/>
-          <a:chOff x="0" y="0"/>
-          <a:chExt cx="0" cy="0"/>
-        </a:xfrm>
-      </p:grpSpPr>
-      <p:sp>
-        <p:nvSpPr>
-          <p:cNvPr id="2" name="Title 1">
-            <a:extLst>
-              <a:ext uri="{FF2B5EF4-FFF2-40B4-BE49-F238E27FC236}">
-                <a16:creationId xmlns:a16="http://schemas.microsoft.com/office/drawing/2014/main" id="{329926EC-CCC6-5741-8D0B-5E0940B48E83}"/>
-              </a:ext>
-            </a:extLst>
-          </p:cNvPr>
-          <p:cNvSpPr>
-            <a:spLocks noGrp="1"/>
-          </p:cNvSpPr>
-          <p:nvPr>
-            <p:ph type="title"/>
-          </p:nvPr>
-        </p:nvSpPr>
-        <p:spPr/>
-        <p:txBody>
-          <a:bodyPr/>
-          <a:lstStyle/>
-          <a:p>
-            <a:r>
-              <a:rPr lang="en-US" dirty="0"/>
-              <a:t>Conclusions</a:t>
-            </a:r>
-          </a:p>
-        </p:txBody>
-      </p:sp>
-      <p:sp>
-        <p:nvSpPr>
-          <p:cNvPr id="3" name="Content Placeholder 2">
-            <a:extLst>
-              <a:ext uri="{FF2B5EF4-FFF2-40B4-BE49-F238E27FC236}">
-                <a16:creationId xmlns:a16="http://schemas.microsoft.com/office/drawing/2014/main" id="{0BFF84AC-1092-6C4A-8424-8688F7204101}"/>
-              </a:ext>
-            </a:extLst>
-          </p:cNvPr>
-          <p:cNvSpPr>
-            <a:spLocks noGrp="1"/>
-          </p:cNvSpPr>
-          <p:nvPr>
-            <p:ph idx="1"/>
-          </p:nvPr>
-        </p:nvSpPr>
-        <p:spPr/>
-        <p:txBody>
-          <a:bodyPr/>
-          <a:lstStyle/>
-          <a:p>
-            <a:r>
-              <a:rPr lang="en-US" dirty="0"/>
-              <a:t>We have created probabilistic catalogs based on 3FGL and 4FGL-DR2 catalogs with classifications of sources into either 2 classes (AGN, PSR) or 3 classes (AGN, PSR, OTHER)</a:t>
-            </a:r>
-          </a:p>
-          <a:p>
-            <a:pPr lvl="1"/>
-            <a:r>
-              <a:rPr lang="en-US" dirty="0"/>
-              <a:t>We make predictions for the likely classes for unassociated sources using four machine learning algorithms</a:t>
-            </a:r>
-          </a:p>
-          <a:p>
-            <a:pPr lvl="1"/>
-            <a:r>
-              <a:rPr lang="en-US" dirty="0"/>
-              <a:t>We test 3FGL predictions against associations in 4FGL-DR2</a:t>
-            </a:r>
-          </a:p>
-          <a:p>
-            <a:pPr lvl="1"/>
-            <a:r>
-              <a:rPr lang="en-US" dirty="0"/>
-              <a:t>We find that one should either correct for OTHER sources in the 2-class case (but the correction depends on binning) or use 3-class classification</a:t>
-            </a:r>
-          </a:p>
-          <a:p>
-            <a:r>
-              <a:rPr lang="en-US" dirty="0"/>
-              <a:t>We are working on a paper</a:t>
-            </a:r>
-          </a:p>
-        </p:txBody>
-      </p:sp>
-      <p:sp>
-        <p:nvSpPr>
-          <p:cNvPr id="4" name="Slide Number Placeholder 3">
-            <a:extLst>
-              <a:ext uri="{FF2B5EF4-FFF2-40B4-BE49-F238E27FC236}">
-                <a16:creationId xmlns:a16="http://schemas.microsoft.com/office/drawing/2014/main" id="{C9A30281-B838-1B41-B871-18FD95F5AA10}"/>
-              </a:ext>
-            </a:extLst>
-          </p:cNvPr>
-          <p:cNvSpPr>
-            <a:spLocks noGrp="1"/>
-          </p:cNvSpPr>
-          <p:nvPr>
-            <p:ph type="sldNum" sz="quarter" idx="12"/>
-          </p:nvPr>
-        </p:nvSpPr>
-        <p:spPr/>
-        <p:txBody>
-          <a:bodyPr/>
-          <a:lstStyle/>
-          <a:p>
-            <a:fld id="{2BE1FEC3-8823-1349-926D-AB6C326E7D50}" type="slidenum">
-              <a:rPr lang="en-US" smtClean="0"/>
-              <a:pPr/>
-              <a:t>23</a:t>
-            </a:fld>
-            <a:endParaRPr lang="en-US"/>
-          </a:p>
-        </p:txBody>
-      </p:sp>
-      <p:sp>
-        <p:nvSpPr>
-          <p:cNvPr id="5" name="Footer Placeholder 4">
-            <a:extLst>
-              <a:ext uri="{FF2B5EF4-FFF2-40B4-BE49-F238E27FC236}">
-                <a16:creationId xmlns:a16="http://schemas.microsoft.com/office/drawing/2014/main" id="{10A15216-98B1-0B4C-BE2A-A79F3776FBF5}"/>
-              </a:ext>
-            </a:extLst>
-          </p:cNvPr>
-          <p:cNvSpPr>
-            <a:spLocks noGrp="1"/>
-          </p:cNvSpPr>
-          <p:nvPr>
-            <p:ph type="ftr" sz="quarter" idx="3"/>
-          </p:nvPr>
-        </p:nvSpPr>
-        <p:spPr/>
-        <p:txBody>
-          <a:bodyPr/>
-          <a:lstStyle/>
-          <a:p>
-            <a:r>
-              <a:rPr lang="en-US"/>
-              <a:t>Dmitry Malyshev, Probabilistic catalogs</a:t>
-            </a:r>
-            <a:endParaRPr lang="en-US" dirty="0"/>
-          </a:p>
-        </p:txBody>
-      </p:sp>
-    </p:spTree>
-    <p:extLst>
-      <p:ext uri="{BB962C8B-B14F-4D97-AF65-F5344CB8AC3E}">
-        <p14:creationId xmlns:p14="http://schemas.microsoft.com/office/powerpoint/2010/main" val="2014958776"/>
-      </p:ext>
-    </p:extLst>
-  </p:cSld>
-  <p:clrMapOvr>
-    <a:masterClrMapping/>
-  </p:clrMapOvr>
-  <p:transition/>
-</p:sld>
-</file>
-
 <file path=ppt/slides/slide24.xml><?xml version="1.0" encoding="utf-8"?>
 <p:sld xmlns:a="http://schemas.openxmlformats.org/drawingml/2006/main" xmlns:r="http://schemas.openxmlformats.org/officeDocument/2006/relationships" xmlns:p="http://schemas.openxmlformats.org/presentationml/2006/main">
   <p:cSld>
@@ -8701,7 +8778,7 @@
           <p:cNvPr id="2" name="Title 1">
             <a:extLst>
               <a:ext uri="{FF2B5EF4-FFF2-40B4-BE49-F238E27FC236}">
-                <a16:creationId xmlns:a16="http://schemas.microsoft.com/office/drawing/2014/main" id="{FB674840-3061-0946-8780-2678B52EF97E}"/>
+                <a16:creationId xmlns:a16="http://schemas.microsoft.com/office/drawing/2014/main" id="{329926EC-CCC6-5741-8D0B-5E0940B48E83}"/>
               </a:ext>
             </a:extLst>
           </p:cNvPr>
@@ -8719,7 +8796,7 @@
           <a:p>
             <a:r>
               <a:rPr lang="en-US" dirty="0"/>
-              <a:t>Backup slides</a:t>
+              <a:t>Conclusions</a:t>
             </a:r>
           </a:p>
         </p:txBody>
@@ -8729,7 +8806,7 @@
           <p:cNvPr id="3" name="Content Placeholder 2">
             <a:extLst>
               <a:ext uri="{FF2B5EF4-FFF2-40B4-BE49-F238E27FC236}">
-                <a16:creationId xmlns:a16="http://schemas.microsoft.com/office/drawing/2014/main" id="{AB82197E-4761-B548-81DA-EB1C1EC47670}"/>
+                <a16:creationId xmlns:a16="http://schemas.microsoft.com/office/drawing/2014/main" id="{0BFF84AC-1092-6C4A-8424-8688F7204101}"/>
               </a:ext>
             </a:extLst>
           </p:cNvPr>
@@ -8745,7 +8822,37 @@
           <a:bodyPr/>
           <a:lstStyle/>
           <a:p>
-            <a:endParaRPr lang="en-US"/>
+            <a:r>
+              <a:rPr lang="en-US" dirty="0"/>
+              <a:t>We have created probabilistic catalogs based on 3FGL and 4FGL-DR2 catalogs with classifications of sources into either 2 classes (AGN, PSR) or 3 classes (AGN, PSR, OTHER)</a:t>
+            </a:r>
+          </a:p>
+          <a:p>
+            <a:pPr lvl="1"/>
+            <a:r>
+              <a:rPr lang="en-US" dirty="0"/>
+              <a:t>We make predictions for the likely classes for unassociated sources using four machine learning algorithms</a:t>
+            </a:r>
+          </a:p>
+          <a:p>
+            <a:pPr lvl="1"/>
+            <a:r>
+              <a:rPr lang="en-US" dirty="0"/>
+              <a:t>We test 3FGL predictions against associations in 4FGL-DR2</a:t>
+            </a:r>
+          </a:p>
+          <a:p>
+            <a:pPr lvl="1"/>
+            <a:r>
+              <a:rPr lang="en-US" dirty="0"/>
+              <a:t>We find that one should either correct for OTHER sources in the 2-class case (but the correction depends on binning) or use 3-class classification</a:t>
+            </a:r>
+          </a:p>
+          <a:p>
+            <a:r>
+              <a:rPr lang="en-US" dirty="0"/>
+              <a:t>We are working on a paper</a:t>
+            </a:r>
           </a:p>
         </p:txBody>
       </p:sp>
@@ -8754,7 +8861,7 @@
           <p:cNvPr id="4" name="Slide Number Placeholder 3">
             <a:extLst>
               <a:ext uri="{FF2B5EF4-FFF2-40B4-BE49-F238E27FC236}">
-                <a16:creationId xmlns:a16="http://schemas.microsoft.com/office/drawing/2014/main" id="{E6C0E6A1-2CD8-704A-A3F5-F0DC3771B332}"/>
+                <a16:creationId xmlns:a16="http://schemas.microsoft.com/office/drawing/2014/main" id="{C9A30281-B838-1B41-B871-18FD95F5AA10}"/>
               </a:ext>
             </a:extLst>
           </p:cNvPr>
@@ -8784,7 +8891,7 @@
           <p:cNvPr id="5" name="Footer Placeholder 4">
             <a:extLst>
               <a:ext uri="{FF2B5EF4-FFF2-40B4-BE49-F238E27FC236}">
-                <a16:creationId xmlns:a16="http://schemas.microsoft.com/office/drawing/2014/main" id="{1CA549AF-E97C-0149-AABA-2A85F17AB80C}"/>
+                <a16:creationId xmlns:a16="http://schemas.microsoft.com/office/drawing/2014/main" id="{10A15216-98B1-0B4C-BE2A-A79F3776FBF5}"/>
               </a:ext>
             </a:extLst>
           </p:cNvPr>
@@ -8811,7 +8918,7 @@
     </p:spTree>
     <p:extLst>
       <p:ext uri="{BB962C8B-B14F-4D97-AF65-F5344CB8AC3E}">
-        <p14:creationId xmlns:p14="http://schemas.microsoft.com/office/powerpoint/2010/main" val="3806597617"/>
+        <p14:creationId xmlns:p14="http://schemas.microsoft.com/office/powerpoint/2010/main" val="2014958776"/>
       </p:ext>
     </p:extLst>
   </p:cSld>
@@ -8844,7 +8951,7 @@
           <p:cNvPr id="2" name="Title 1">
             <a:extLst>
               <a:ext uri="{FF2B5EF4-FFF2-40B4-BE49-F238E27FC236}">
-                <a16:creationId xmlns:a16="http://schemas.microsoft.com/office/drawing/2014/main" id="{FD3BED72-9053-3D4F-9620-EC4E728AD604}"/>
+                <a16:creationId xmlns:a16="http://schemas.microsoft.com/office/drawing/2014/main" id="{FB674840-3061-0946-8780-2678B52EF97E}"/>
               </a:ext>
             </a:extLst>
           </p:cNvPr>
@@ -8862,55 +8969,7 @@
           <a:p>
             <a:r>
               <a:rPr lang="en-US" dirty="0"/>
-              <a:t>RF: optimization of meta-parameters</a:t>
-            </a:r>
-          </a:p>
-        </p:txBody>
-      </p:sp>
-      <p:sp>
-        <p:nvSpPr>
-          <p:cNvPr id="3" name="Content Placeholder 2">
-            <a:extLst>
-              <a:ext uri="{FF2B5EF4-FFF2-40B4-BE49-F238E27FC236}">
-                <a16:creationId xmlns:a16="http://schemas.microsoft.com/office/drawing/2014/main" id="{F20360A6-0D6C-4D41-840B-868257353E4E}"/>
-              </a:ext>
-            </a:extLst>
-          </p:cNvPr>
-          <p:cNvSpPr>
-            <a:spLocks noGrp="1"/>
-          </p:cNvSpPr>
-          <p:nvPr>
-            <p:ph idx="1"/>
-          </p:nvPr>
-        </p:nvSpPr>
-        <p:spPr/>
-        <p:txBody>
-          <a:bodyPr/>
-          <a:lstStyle/>
-          <a:p>
-            <a:r>
-              <a:rPr lang="en-US" dirty="0"/>
-              <a:t>As an example, we will start with the optimization of meta-parameters for the RF algorithm</a:t>
-            </a:r>
-          </a:p>
-          <a:p>
-            <a:r>
-              <a:rPr lang="en-US" dirty="0"/>
-              <a:t>Parameters:</a:t>
-            </a:r>
-          </a:p>
-          <a:p>
-            <a:pPr lvl="1"/>
-            <a:r>
-              <a:rPr lang="en-US" dirty="0"/>
-              <a:t>Number of trees</a:t>
-            </a:r>
-          </a:p>
-          <a:p>
-            <a:pPr lvl="1"/>
-            <a:r>
-              <a:rPr lang="en-US" dirty="0"/>
-              <a:t>Maximal depth of a tree</a:t>
+              <a:t>Backup slides</a:t>
             </a:r>
           </a:p>
         </p:txBody>
@@ -8920,7 +8979,7 @@
           <p:cNvPr id="4" name="Slide Number Placeholder 3">
             <a:extLst>
               <a:ext uri="{FF2B5EF4-FFF2-40B4-BE49-F238E27FC236}">
-                <a16:creationId xmlns:a16="http://schemas.microsoft.com/office/drawing/2014/main" id="{05D19C3C-684D-864F-9EF8-1771E4356936}"/>
+                <a16:creationId xmlns:a16="http://schemas.microsoft.com/office/drawing/2014/main" id="{E6C0E6A1-2CD8-704A-A3F5-F0DC3771B332}"/>
               </a:ext>
             </a:extLst>
           </p:cNvPr>
@@ -8950,7 +9009,7 @@
           <p:cNvPr id="5" name="Footer Placeholder 4">
             <a:extLst>
               <a:ext uri="{FF2B5EF4-FFF2-40B4-BE49-F238E27FC236}">
-                <a16:creationId xmlns:a16="http://schemas.microsoft.com/office/drawing/2014/main" id="{CB54D31A-5715-CB48-A831-8D0A9C59E5F1}"/>
+                <a16:creationId xmlns:a16="http://schemas.microsoft.com/office/drawing/2014/main" id="{1CA549AF-E97C-0149-AABA-2A85F17AB80C}"/>
               </a:ext>
             </a:extLst>
           </p:cNvPr>
@@ -8971,78 +9030,13 @@
               <a:t>Dmitry Malyshev, Probabilistic catalogs</a:t>
             </a:r>
             <a:endParaRPr lang="en-US" dirty="0"/>
-          </a:p>
-        </p:txBody>
-      </p:sp>
-      <p:pic>
-        <p:nvPicPr>
-          <p:cNvPr id="7" name="Picture 6">
-            <a:extLst>
-              <a:ext uri="{FF2B5EF4-FFF2-40B4-BE49-F238E27FC236}">
-                <a16:creationId xmlns:a16="http://schemas.microsoft.com/office/drawing/2014/main" id="{A4B07B71-053A-B148-9DBC-669737B21880}"/>
-              </a:ext>
-            </a:extLst>
-          </p:cNvPr>
-          <p:cNvPicPr>
-            <a:picLocks noChangeAspect="1"/>
-          </p:cNvPicPr>
-          <p:nvPr/>
-        </p:nvPicPr>
-        <p:blipFill>
-          <a:blip r:embed="rId2"/>
-          <a:stretch>
-            <a:fillRect/>
-          </a:stretch>
-        </p:blipFill>
-        <p:spPr>
-          <a:xfrm>
-            <a:off x="381000" y="2971800"/>
-            <a:ext cx="6318383" cy="3236914"/>
-          </a:xfrm>
-          <a:prstGeom prst="rect">
-            <a:avLst/>
-          </a:prstGeom>
-        </p:spPr>
-      </p:pic>
-      <p:sp>
-        <p:nvSpPr>
-          <p:cNvPr id="8" name="TextBox 7">
-            <a:extLst>
-              <a:ext uri="{FF2B5EF4-FFF2-40B4-BE49-F238E27FC236}">
-                <a16:creationId xmlns:a16="http://schemas.microsoft.com/office/drawing/2014/main" id="{773846CE-2885-1E46-9549-133809716869}"/>
-              </a:ext>
-            </a:extLst>
-          </p:cNvPr>
-          <p:cNvSpPr txBox="1"/>
-          <p:nvPr/>
-        </p:nvSpPr>
-        <p:spPr>
-          <a:xfrm>
-            <a:off x="6705600" y="2895600"/>
-            <a:ext cx="1981200" cy="2862322"/>
-          </a:xfrm>
-          <a:prstGeom prst="rect">
-            <a:avLst/>
-          </a:prstGeom>
-          <a:noFill/>
-        </p:spPr>
-        <p:txBody>
-          <a:bodyPr wrap="square" rtlCol="0">
-            <a:spAutoFit/>
-          </a:bodyPr>
-          <a:lstStyle/>
-          <a:p>
-            <a:r>
-              <a:rPr lang="en-US" dirty="0"/>
-              <a:t>The testing score is obtained by taking 1000 realizations of 70/30 % splits and calculating the average performance on the 30% testing samples</a:t>
-            </a:r>
           </a:p>
         </p:txBody>
       </p:sp>
     </p:spTree>
     <p:extLst>
       <p:ext uri="{BB962C8B-B14F-4D97-AF65-F5344CB8AC3E}">
-        <p14:creationId xmlns:p14="http://schemas.microsoft.com/office/powerpoint/2010/main" val="3475760246"/>
+        <p14:creationId xmlns:p14="http://schemas.microsoft.com/office/powerpoint/2010/main" val="3806597617"/>
       </p:ext>
     </p:extLst>
   </p:cSld>
@@ -9075,7 +9069,7 @@
           <p:cNvPr id="2" name="Title 1">
             <a:extLst>
               <a:ext uri="{FF2B5EF4-FFF2-40B4-BE49-F238E27FC236}">
-                <a16:creationId xmlns:a16="http://schemas.microsoft.com/office/drawing/2014/main" id="{96C38F6F-48F1-DA4E-97B9-890FF723760E}"/>
+                <a16:creationId xmlns:a16="http://schemas.microsoft.com/office/drawing/2014/main" id="{FD3BED72-9053-3D4F-9620-EC4E728AD604}"/>
               </a:ext>
             </a:extLst>
           </p:cNvPr>
@@ -9093,7 +9087,7 @@
           <a:p>
             <a:r>
               <a:rPr lang="en-US" dirty="0"/>
-              <a:t>Logistic regression</a:t>
+              <a:t>RF: optimization of meta-parameters</a:t>
             </a:r>
           </a:p>
         </p:txBody>
@@ -9103,7 +9097,7 @@
           <p:cNvPr id="3" name="Content Placeholder 2">
             <a:extLst>
               <a:ext uri="{FF2B5EF4-FFF2-40B4-BE49-F238E27FC236}">
-                <a16:creationId xmlns:a16="http://schemas.microsoft.com/office/drawing/2014/main" id="{F1A99C07-DB58-B24D-A99B-1CEA9142C194}"/>
+                <a16:creationId xmlns:a16="http://schemas.microsoft.com/office/drawing/2014/main" id="{F20360A6-0D6C-4D41-840B-868257353E4E}"/>
               </a:ext>
             </a:extLst>
           </p:cNvPr>
@@ -9121,85 +9115,27 @@
           <a:p>
             <a:r>
               <a:rPr lang="en-US" dirty="0"/>
-              <a:t>Probability domains for LR:</a:t>
-            </a:r>
-          </a:p>
-          <a:p>
-            <a:endParaRPr lang="en-US" dirty="0"/>
-          </a:p>
-          <a:p>
-            <a:endParaRPr lang="en-US" dirty="0"/>
-          </a:p>
-          <a:p>
-            <a:endParaRPr lang="en-US" dirty="0"/>
-          </a:p>
-          <a:p>
-            <a:endParaRPr lang="en-US" dirty="0"/>
-          </a:p>
-          <a:p>
-            <a:endParaRPr lang="en-US" dirty="0"/>
-          </a:p>
-          <a:p>
-            <a:endParaRPr lang="en-US" dirty="0"/>
-          </a:p>
-          <a:p>
-            <a:endParaRPr lang="en-US" dirty="0"/>
-          </a:p>
-          <a:p>
-            <a:endParaRPr lang="en-US" dirty="0"/>
-          </a:p>
-          <a:p>
-            <a:pPr marL="0" indent="0">
-              <a:buNone/>
-            </a:pPr>
-            <a:endParaRPr lang="en-US" dirty="0"/>
-          </a:p>
-          <a:p>
-            <a:r>
-              <a:rPr lang="en-US" dirty="0"/>
-              <a:t>In general, </a:t>
-            </a:r>
-            <a:r>
-              <a:rPr lang="en-US" i="1" dirty="0">
-                <a:solidFill>
-                  <a:srgbClr val="0432FF"/>
-                </a:solidFill>
-              </a:rPr>
-              <a:t>f(x)</a:t>
-            </a:r>
-            <a:r>
-              <a:rPr lang="en-US" dirty="0"/>
-              <a:t> can be a non-linear function of input features </a:t>
-            </a:r>
-            <a:r>
-              <a:rPr lang="en-US" i="1" dirty="0">
-                <a:solidFill>
-                  <a:srgbClr val="0432FF"/>
-                </a:solidFill>
-              </a:rPr>
-              <a:t>x</a:t>
-            </a:r>
-            <a:r>
-              <a:rPr lang="en-US" dirty="0"/>
-              <a:t>. In this case, more complicated boundaries are possible.</a:t>
-            </a:r>
-          </a:p>
-          <a:p>
-            <a:r>
-              <a:rPr lang="en-US" dirty="0"/>
-              <a:t>We see that already linear </a:t>
-            </a:r>
-            <a:r>
-              <a:rPr lang="en-US" i="1" dirty="0">
-                <a:solidFill>
-                  <a:srgbClr val="0432FF"/>
-                </a:solidFill>
-              </a:rPr>
-              <a:t>f(x)</a:t>
-            </a:r>
-            <a:r>
-              <a:rPr lang="en-US" dirty="0"/>
-              <a:t> gives good classification accuracy.</a:t>
+              <a:t>As an example, we will start with the optimization of meta-parameters for the RF algorithm</a:t>
+            </a:r>
+          </a:p>
+          <a:p>
+            <a:r>
+              <a:rPr lang="en-US" dirty="0"/>
+              <a:t>Parameters:</a:t>
+            </a:r>
+          </a:p>
+          <a:p>
+            <a:pPr lvl="1"/>
+            <a:r>
+              <a:rPr lang="en-US" dirty="0"/>
+              <a:t>Number of trees</a:t>
+            </a:r>
+          </a:p>
+          <a:p>
+            <a:pPr lvl="1"/>
+            <a:r>
+              <a:rPr lang="en-US" dirty="0"/>
+              <a:t>Maximal depth of a tree</a:t>
             </a:r>
           </a:p>
         </p:txBody>
@@ -9209,7 +9145,7 @@
           <p:cNvPr id="4" name="Slide Number Placeholder 3">
             <a:extLst>
               <a:ext uri="{FF2B5EF4-FFF2-40B4-BE49-F238E27FC236}">
-                <a16:creationId xmlns:a16="http://schemas.microsoft.com/office/drawing/2014/main" id="{4F6EEFDE-0362-5043-A393-C1631BD47AAB}"/>
+                <a16:creationId xmlns:a16="http://schemas.microsoft.com/office/drawing/2014/main" id="{05D19C3C-684D-864F-9EF8-1771E4356936}"/>
               </a:ext>
             </a:extLst>
           </p:cNvPr>
@@ -9239,7 +9175,7 @@
           <p:cNvPr id="5" name="Footer Placeholder 4">
             <a:extLst>
               <a:ext uri="{FF2B5EF4-FFF2-40B4-BE49-F238E27FC236}">
-                <a16:creationId xmlns:a16="http://schemas.microsoft.com/office/drawing/2014/main" id="{BD7124F1-F665-9548-A445-AD2677279362}"/>
+                <a16:creationId xmlns:a16="http://schemas.microsoft.com/office/drawing/2014/main" id="{CB54D31A-5715-CB48-A831-8D0A9C59E5F1}"/>
               </a:ext>
             </a:extLst>
           </p:cNvPr>
@@ -9265,10 +9201,10 @@
       </p:sp>
       <p:pic>
         <p:nvPicPr>
-          <p:cNvPr id="8" name="Picture 7">
-            <a:extLst>
-              <a:ext uri="{FF2B5EF4-FFF2-40B4-BE49-F238E27FC236}">
-                <a16:creationId xmlns:a16="http://schemas.microsoft.com/office/drawing/2014/main" id="{414C4072-E2EE-6445-B501-2A4B1A6F7865}"/>
+          <p:cNvPr id="7" name="Picture 6">
+            <a:extLst>
+              <a:ext uri="{FF2B5EF4-FFF2-40B4-BE49-F238E27FC236}">
+                <a16:creationId xmlns:a16="http://schemas.microsoft.com/office/drawing/2014/main" id="{A4B07B71-053A-B148-9DBC-669737B21880}"/>
               </a:ext>
             </a:extLst>
           </p:cNvPr>
@@ -9285,78 +9221,53 @@
         </p:blipFill>
         <p:spPr>
           <a:xfrm>
-            <a:off x="6043855" y="2052410"/>
-            <a:ext cx="2649476" cy="557784"/>
+            <a:off x="381000" y="2971800"/>
+            <a:ext cx="6318383" cy="3236914"/>
           </a:xfrm>
           <a:prstGeom prst="rect">
             <a:avLst/>
           </a:prstGeom>
         </p:spPr>
       </p:pic>
-      <p:pic>
-        <p:nvPicPr>
-          <p:cNvPr id="9" name="Picture 8">
-            <a:extLst>
-              <a:ext uri="{FF2B5EF4-FFF2-40B4-BE49-F238E27FC236}">
-                <a16:creationId xmlns:a16="http://schemas.microsoft.com/office/drawing/2014/main" id="{82AD288E-292E-D34A-8152-1B6E3799C985}"/>
-              </a:ext>
-            </a:extLst>
-          </p:cNvPr>
-          <p:cNvPicPr>
-            <a:picLocks noChangeAspect="1"/>
-          </p:cNvPicPr>
+      <p:sp>
+        <p:nvSpPr>
+          <p:cNvPr id="8" name="TextBox 7">
+            <a:extLst>
+              <a:ext uri="{FF2B5EF4-FFF2-40B4-BE49-F238E27FC236}">
+                <a16:creationId xmlns:a16="http://schemas.microsoft.com/office/drawing/2014/main" id="{773846CE-2885-1E46-9549-133809716869}"/>
+              </a:ext>
+            </a:extLst>
+          </p:cNvPr>
+          <p:cNvSpPr txBox="1"/>
           <p:nvPr/>
-        </p:nvPicPr>
-        <p:blipFill>
-          <a:blip r:embed="rId3"/>
-          <a:stretch>
-            <a:fillRect/>
-          </a:stretch>
-        </p:blipFill>
+        </p:nvSpPr>
         <p:spPr>
           <a:xfrm>
-            <a:off x="6102531" y="2945203"/>
-            <a:ext cx="1883396" cy="329137"/>
+            <a:off x="6705600" y="2895600"/>
+            <a:ext cx="1981200" cy="2862322"/>
           </a:xfrm>
           <a:prstGeom prst="rect">
             <a:avLst/>
           </a:prstGeom>
+          <a:noFill/>
         </p:spPr>
-      </p:pic>
-      <p:pic>
-        <p:nvPicPr>
-          <p:cNvPr id="7" name="Picture 6">
-            <a:extLst>
-              <a:ext uri="{FF2B5EF4-FFF2-40B4-BE49-F238E27FC236}">
-                <a16:creationId xmlns:a16="http://schemas.microsoft.com/office/drawing/2014/main" id="{708DCA7B-245F-6A43-85E5-3B84B011D3B7}"/>
-              </a:ext>
-            </a:extLst>
-          </p:cNvPr>
-          <p:cNvPicPr>
-            <a:picLocks noChangeAspect="1"/>
-          </p:cNvPicPr>
-          <p:nvPr/>
-        </p:nvPicPr>
-        <p:blipFill>
-          <a:blip r:embed="rId4"/>
-          <a:stretch>
-            <a:fillRect/>
-          </a:stretch>
-        </p:blipFill>
-        <p:spPr>
-          <a:xfrm>
-            <a:off x="304800" y="1726408"/>
-            <a:ext cx="5166707" cy="3229192"/>
-          </a:xfrm>
-          <a:prstGeom prst="rect">
-            <a:avLst/>
-          </a:prstGeom>
-        </p:spPr>
-      </p:pic>
+        <p:txBody>
+          <a:bodyPr wrap="square" rtlCol="0">
+            <a:spAutoFit/>
+          </a:bodyPr>
+          <a:lstStyle/>
+          <a:p>
+            <a:r>
+              <a:rPr lang="en-US" dirty="0"/>
+              <a:t>The testing score is obtained by taking 1000 realizations of 70/30 % splits and calculating the average performance on the 30% testing samples</a:t>
+            </a:r>
+          </a:p>
+        </p:txBody>
+      </p:sp>
     </p:spTree>
     <p:extLst>
       <p:ext uri="{BB962C8B-B14F-4D97-AF65-F5344CB8AC3E}">
-        <p14:creationId xmlns:p14="http://schemas.microsoft.com/office/powerpoint/2010/main" val="2310048612"/>
+        <p14:creationId xmlns:p14="http://schemas.microsoft.com/office/powerpoint/2010/main" val="3475760246"/>
       </p:ext>
     </p:extLst>
   </p:cSld>
@@ -9389,6 +9300,320 @@
           <p:cNvPr id="2" name="Title 1">
             <a:extLst>
               <a:ext uri="{FF2B5EF4-FFF2-40B4-BE49-F238E27FC236}">
+                <a16:creationId xmlns:a16="http://schemas.microsoft.com/office/drawing/2014/main" id="{96C38F6F-48F1-DA4E-97B9-890FF723760E}"/>
+              </a:ext>
+            </a:extLst>
+          </p:cNvPr>
+          <p:cNvSpPr>
+            <a:spLocks noGrp="1"/>
+          </p:cNvSpPr>
+          <p:nvPr>
+            <p:ph type="title"/>
+          </p:nvPr>
+        </p:nvSpPr>
+        <p:spPr/>
+        <p:txBody>
+          <a:bodyPr/>
+          <a:lstStyle/>
+          <a:p>
+            <a:r>
+              <a:rPr lang="en-US" dirty="0"/>
+              <a:t>Logistic regression</a:t>
+            </a:r>
+          </a:p>
+        </p:txBody>
+      </p:sp>
+      <p:sp>
+        <p:nvSpPr>
+          <p:cNvPr id="3" name="Content Placeholder 2">
+            <a:extLst>
+              <a:ext uri="{FF2B5EF4-FFF2-40B4-BE49-F238E27FC236}">
+                <a16:creationId xmlns:a16="http://schemas.microsoft.com/office/drawing/2014/main" id="{F1A99C07-DB58-B24D-A99B-1CEA9142C194}"/>
+              </a:ext>
+            </a:extLst>
+          </p:cNvPr>
+          <p:cNvSpPr>
+            <a:spLocks noGrp="1"/>
+          </p:cNvSpPr>
+          <p:nvPr>
+            <p:ph idx="1"/>
+          </p:nvPr>
+        </p:nvSpPr>
+        <p:spPr/>
+        <p:txBody>
+          <a:bodyPr/>
+          <a:lstStyle/>
+          <a:p>
+            <a:r>
+              <a:rPr lang="en-US" dirty="0"/>
+              <a:t>Probability domains for LR:</a:t>
+            </a:r>
+          </a:p>
+          <a:p>
+            <a:endParaRPr lang="en-US" dirty="0"/>
+          </a:p>
+          <a:p>
+            <a:endParaRPr lang="en-US" dirty="0"/>
+          </a:p>
+          <a:p>
+            <a:endParaRPr lang="en-US" dirty="0"/>
+          </a:p>
+          <a:p>
+            <a:endParaRPr lang="en-US" dirty="0"/>
+          </a:p>
+          <a:p>
+            <a:endParaRPr lang="en-US" dirty="0"/>
+          </a:p>
+          <a:p>
+            <a:endParaRPr lang="en-US" dirty="0"/>
+          </a:p>
+          <a:p>
+            <a:endParaRPr lang="en-US" dirty="0"/>
+          </a:p>
+          <a:p>
+            <a:endParaRPr lang="en-US" dirty="0"/>
+          </a:p>
+          <a:p>
+            <a:pPr marL="0" indent="0">
+              <a:buNone/>
+            </a:pPr>
+            <a:endParaRPr lang="en-US" dirty="0"/>
+          </a:p>
+          <a:p>
+            <a:r>
+              <a:rPr lang="en-US" dirty="0"/>
+              <a:t>In general, </a:t>
+            </a:r>
+            <a:r>
+              <a:rPr lang="en-US" i="1" dirty="0">
+                <a:solidFill>
+                  <a:srgbClr val="0432FF"/>
+                </a:solidFill>
+              </a:rPr>
+              <a:t>f(x)</a:t>
+            </a:r>
+            <a:r>
+              <a:rPr lang="en-US" dirty="0"/>
+              <a:t> can be a non-linear function of input features </a:t>
+            </a:r>
+            <a:r>
+              <a:rPr lang="en-US" i="1" dirty="0">
+                <a:solidFill>
+                  <a:srgbClr val="0432FF"/>
+                </a:solidFill>
+              </a:rPr>
+              <a:t>x</a:t>
+            </a:r>
+            <a:r>
+              <a:rPr lang="en-US" dirty="0"/>
+              <a:t>. In this case, more complicated boundaries are possible.</a:t>
+            </a:r>
+          </a:p>
+          <a:p>
+            <a:r>
+              <a:rPr lang="en-US" dirty="0"/>
+              <a:t>We see that already linear </a:t>
+            </a:r>
+            <a:r>
+              <a:rPr lang="en-US" i="1" dirty="0">
+                <a:solidFill>
+                  <a:srgbClr val="0432FF"/>
+                </a:solidFill>
+              </a:rPr>
+              <a:t>f(x)</a:t>
+            </a:r>
+            <a:r>
+              <a:rPr lang="en-US" dirty="0"/>
+              <a:t> gives good classification accuracy.</a:t>
+            </a:r>
+          </a:p>
+        </p:txBody>
+      </p:sp>
+      <p:sp>
+        <p:nvSpPr>
+          <p:cNvPr id="4" name="Slide Number Placeholder 3">
+            <a:extLst>
+              <a:ext uri="{FF2B5EF4-FFF2-40B4-BE49-F238E27FC236}">
+                <a16:creationId xmlns:a16="http://schemas.microsoft.com/office/drawing/2014/main" id="{4F6EEFDE-0362-5043-A393-C1631BD47AAB}"/>
+              </a:ext>
+            </a:extLst>
+          </p:cNvPr>
+          <p:cNvSpPr>
+            <a:spLocks noGrp="1"/>
+          </p:cNvSpPr>
+          <p:nvPr>
+            <p:ph type="sldNum" sz="quarter" idx="12"/>
+          </p:nvPr>
+        </p:nvSpPr>
+        <p:spPr/>
+        <p:txBody>
+          <a:bodyPr/>
+          <a:lstStyle/>
+          <a:p>
+            <a:fld id="{2BE1FEC3-8823-1349-926D-AB6C326E7D50}" type="slidenum">
+              <a:rPr lang="en-US" smtClean="0"/>
+              <a:pPr/>
+              <a:t>27</a:t>
+            </a:fld>
+            <a:endParaRPr lang="en-US"/>
+          </a:p>
+        </p:txBody>
+      </p:sp>
+      <p:sp>
+        <p:nvSpPr>
+          <p:cNvPr id="5" name="Footer Placeholder 4">
+            <a:extLst>
+              <a:ext uri="{FF2B5EF4-FFF2-40B4-BE49-F238E27FC236}">
+                <a16:creationId xmlns:a16="http://schemas.microsoft.com/office/drawing/2014/main" id="{BD7124F1-F665-9548-A445-AD2677279362}"/>
+              </a:ext>
+            </a:extLst>
+          </p:cNvPr>
+          <p:cNvSpPr>
+            <a:spLocks noGrp="1"/>
+          </p:cNvSpPr>
+          <p:nvPr>
+            <p:ph type="ftr" sz="quarter" idx="3"/>
+          </p:nvPr>
+        </p:nvSpPr>
+        <p:spPr/>
+        <p:txBody>
+          <a:bodyPr/>
+          <a:lstStyle/>
+          <a:p>
+            <a:r>
+              <a:rPr lang="en-US"/>
+              <a:t>Dmitry Malyshev, Probabilistic catalogs</a:t>
+            </a:r>
+            <a:endParaRPr lang="en-US" dirty="0"/>
+          </a:p>
+        </p:txBody>
+      </p:sp>
+      <p:pic>
+        <p:nvPicPr>
+          <p:cNvPr id="8" name="Picture 7">
+            <a:extLst>
+              <a:ext uri="{FF2B5EF4-FFF2-40B4-BE49-F238E27FC236}">
+                <a16:creationId xmlns:a16="http://schemas.microsoft.com/office/drawing/2014/main" id="{414C4072-E2EE-6445-B501-2A4B1A6F7865}"/>
+              </a:ext>
+            </a:extLst>
+          </p:cNvPr>
+          <p:cNvPicPr>
+            <a:picLocks noChangeAspect="1"/>
+          </p:cNvPicPr>
+          <p:nvPr/>
+        </p:nvPicPr>
+        <p:blipFill>
+          <a:blip r:embed="rId2"/>
+          <a:stretch>
+            <a:fillRect/>
+          </a:stretch>
+        </p:blipFill>
+        <p:spPr>
+          <a:xfrm>
+            <a:off x="6043855" y="2052410"/>
+            <a:ext cx="2649476" cy="557784"/>
+          </a:xfrm>
+          <a:prstGeom prst="rect">
+            <a:avLst/>
+          </a:prstGeom>
+        </p:spPr>
+      </p:pic>
+      <p:pic>
+        <p:nvPicPr>
+          <p:cNvPr id="9" name="Picture 8">
+            <a:extLst>
+              <a:ext uri="{FF2B5EF4-FFF2-40B4-BE49-F238E27FC236}">
+                <a16:creationId xmlns:a16="http://schemas.microsoft.com/office/drawing/2014/main" id="{82AD288E-292E-D34A-8152-1B6E3799C985}"/>
+              </a:ext>
+            </a:extLst>
+          </p:cNvPr>
+          <p:cNvPicPr>
+            <a:picLocks noChangeAspect="1"/>
+          </p:cNvPicPr>
+          <p:nvPr/>
+        </p:nvPicPr>
+        <p:blipFill>
+          <a:blip r:embed="rId3"/>
+          <a:stretch>
+            <a:fillRect/>
+          </a:stretch>
+        </p:blipFill>
+        <p:spPr>
+          <a:xfrm>
+            <a:off x="6102531" y="2945203"/>
+            <a:ext cx="1883396" cy="329137"/>
+          </a:xfrm>
+          <a:prstGeom prst="rect">
+            <a:avLst/>
+          </a:prstGeom>
+        </p:spPr>
+      </p:pic>
+      <p:pic>
+        <p:nvPicPr>
+          <p:cNvPr id="10" name="Grafik 9">
+            <a:extLst>
+              <a:ext uri="{FF2B5EF4-FFF2-40B4-BE49-F238E27FC236}">
+                <a16:creationId xmlns:a16="http://schemas.microsoft.com/office/drawing/2014/main" id="{1A7C7737-20E9-4C73-958D-5F5CFE283CB6}"/>
+              </a:ext>
+            </a:extLst>
+          </p:cNvPr>
+          <p:cNvPicPr>
+            <a:picLocks noChangeAspect="1"/>
+          </p:cNvPicPr>
+          <p:nvPr/>
+        </p:nvPicPr>
+        <p:blipFill>
+          <a:blip r:embed="rId4"/>
+          <a:stretch>
+            <a:fillRect/>
+          </a:stretch>
+        </p:blipFill>
+        <p:spPr>
+          <a:xfrm>
+            <a:off x="678111" y="1676400"/>
+            <a:ext cx="4844069" cy="3124200"/>
+          </a:xfrm>
+          <a:prstGeom prst="rect">
+            <a:avLst/>
+          </a:prstGeom>
+        </p:spPr>
+      </p:pic>
+    </p:spTree>
+    <p:extLst>
+      <p:ext uri="{BB962C8B-B14F-4D97-AF65-F5344CB8AC3E}">
+        <p14:creationId xmlns:p14="http://schemas.microsoft.com/office/powerpoint/2010/main" val="2310048612"/>
+      </p:ext>
+    </p:extLst>
+  </p:cSld>
+  <p:clrMapOvr>
+    <a:masterClrMapping/>
+  </p:clrMapOvr>
+  <p:transition/>
+</p:sld>
+</file>
+
+<file path=ppt/slides/slide28.xml><?xml version="1.0" encoding="utf-8"?>
+<p:sld xmlns:a="http://schemas.openxmlformats.org/drawingml/2006/main" xmlns:r="http://schemas.openxmlformats.org/officeDocument/2006/relationships" xmlns:p="http://schemas.openxmlformats.org/presentationml/2006/main">
+  <p:cSld>
+    <p:spTree>
+      <p:nvGrpSpPr>
+        <p:cNvPr id="1" name=""/>
+        <p:cNvGrpSpPr/>
+        <p:nvPr/>
+      </p:nvGrpSpPr>
+      <p:grpSpPr>
+        <a:xfrm>
+          <a:off x="0" y="0"/>
+          <a:ext cx="0" cy="0"/>
+          <a:chOff x="0" y="0"/>
+          <a:chExt cx="0" cy="0"/>
+        </a:xfrm>
+      </p:grpSpPr>
+      <p:sp>
+        <p:nvSpPr>
+          <p:cNvPr id="2" name="Title 1">
+            <a:extLst>
+              <a:ext uri="{FF2B5EF4-FFF2-40B4-BE49-F238E27FC236}">
                 <a16:creationId xmlns:a16="http://schemas.microsoft.com/office/drawing/2014/main" id="{5F39AB6C-1224-3241-8AB9-4849CF228221}"/>
               </a:ext>
             </a:extLst>
@@ -9482,7 +9707,7 @@
             <a:fld id="{2BE1FEC3-8823-1349-926D-AB6C326E7D50}" type="slidenum">
               <a:rPr lang="en-US" smtClean="0"/>
               <a:pPr/>
-              <a:t>27</a:t>
+              <a:t>28</a:t>
             </a:fld>
             <a:endParaRPr lang="en-US"/>
           </a:p>
@@ -10936,7 +11161,7 @@
 </p:sld>
 </file>
 
-<file path=ppt/slides/slide28.xml><?xml version="1.0" encoding="utf-8"?>
+<file path=ppt/slides/slide29.xml><?xml version="1.0" encoding="utf-8"?>
 <p:sld xmlns:a="http://schemas.openxmlformats.org/drawingml/2006/main" xmlns:r="http://schemas.openxmlformats.org/officeDocument/2006/relationships" xmlns:p="http://schemas.openxmlformats.org/presentationml/2006/main">
   <p:cSld>
     <p:spTree>
@@ -11039,7 +11264,7 @@
             <a:fld id="{2BE1FEC3-8823-1349-926D-AB6C326E7D50}" type="slidenum">
               <a:rPr lang="en-US" smtClean="0"/>
               <a:pPr/>
-              <a:t>28</a:t>
+              <a:t>29</a:t>
             </a:fld>
             <a:endParaRPr lang="en-US"/>
           </a:p>
@@ -11118,212 +11343,6 @@
 </p:sld>
 </file>
 
-<file path=ppt/slides/slide29.xml><?xml version="1.0" encoding="utf-8"?>
-<p:sld xmlns:a="http://schemas.openxmlformats.org/drawingml/2006/main" xmlns:r="http://schemas.openxmlformats.org/officeDocument/2006/relationships" xmlns:p="http://schemas.openxmlformats.org/presentationml/2006/main">
-  <p:cSld>
-    <p:spTree>
-      <p:nvGrpSpPr>
-        <p:cNvPr id="1" name=""/>
-        <p:cNvGrpSpPr/>
-        <p:nvPr/>
-      </p:nvGrpSpPr>
-      <p:grpSpPr>
-        <a:xfrm>
-          <a:off x="0" y="0"/>
-          <a:ext cx="0" cy="0"/>
-          <a:chOff x="0" y="0"/>
-          <a:chExt cx="0" cy="0"/>
-        </a:xfrm>
-      </p:grpSpPr>
-      <p:sp>
-        <p:nvSpPr>
-          <p:cNvPr id="2" name="Title 1">
-            <a:extLst>
-              <a:ext uri="{FF2B5EF4-FFF2-40B4-BE49-F238E27FC236}">
-                <a16:creationId xmlns:a16="http://schemas.microsoft.com/office/drawing/2014/main" id="{5082B5D6-8E28-E24C-BDBA-B07C988DA458}"/>
-              </a:ext>
-            </a:extLst>
-          </p:cNvPr>
-          <p:cNvSpPr>
-            <a:spLocks noGrp="1"/>
-          </p:cNvSpPr>
-          <p:nvPr>
-            <p:ph type="title"/>
-          </p:nvPr>
-        </p:nvSpPr>
-        <p:spPr/>
-        <p:txBody>
-          <a:bodyPr/>
-          <a:lstStyle/>
-          <a:p>
-            <a:r>
-              <a:rPr lang="en-US" dirty="0"/>
-              <a:t>NN domains</a:t>
-            </a:r>
-          </a:p>
-        </p:txBody>
-      </p:sp>
-      <p:sp>
-        <p:nvSpPr>
-          <p:cNvPr id="3" name="Content Placeholder 2">
-            <a:extLst>
-              <a:ext uri="{FF2B5EF4-FFF2-40B4-BE49-F238E27FC236}">
-                <a16:creationId xmlns:a16="http://schemas.microsoft.com/office/drawing/2014/main" id="{4F2A6BF6-6BDD-2544-8678-9E758E3E7717}"/>
-              </a:ext>
-            </a:extLst>
-          </p:cNvPr>
-          <p:cNvSpPr>
-            <a:spLocks noGrp="1"/>
-          </p:cNvSpPr>
-          <p:nvPr>
-            <p:ph idx="1"/>
-          </p:nvPr>
-        </p:nvSpPr>
-        <p:spPr/>
-        <p:txBody>
-          <a:bodyPr/>
-          <a:lstStyle/>
-          <a:p>
-            <a:r>
-              <a:rPr lang="en-US" dirty="0"/>
-              <a:t>The domains for NN are similar to LR, but the boundary is non-linear</a:t>
-            </a:r>
-          </a:p>
-        </p:txBody>
-      </p:sp>
-      <p:sp>
-        <p:nvSpPr>
-          <p:cNvPr id="4" name="Slide Number Placeholder 3">
-            <a:extLst>
-              <a:ext uri="{FF2B5EF4-FFF2-40B4-BE49-F238E27FC236}">
-                <a16:creationId xmlns:a16="http://schemas.microsoft.com/office/drawing/2014/main" id="{04735917-ADCD-3745-BFAE-EA92B6327B28}"/>
-              </a:ext>
-            </a:extLst>
-          </p:cNvPr>
-          <p:cNvSpPr>
-            <a:spLocks noGrp="1"/>
-          </p:cNvSpPr>
-          <p:nvPr>
-            <p:ph type="sldNum" sz="quarter" idx="12"/>
-          </p:nvPr>
-        </p:nvSpPr>
-        <p:spPr/>
-        <p:txBody>
-          <a:bodyPr/>
-          <a:lstStyle/>
-          <a:p>
-            <a:fld id="{2BE1FEC3-8823-1349-926D-AB6C326E7D50}" type="slidenum">
-              <a:rPr lang="en-US" smtClean="0"/>
-              <a:pPr/>
-              <a:t>29</a:t>
-            </a:fld>
-            <a:endParaRPr lang="en-US"/>
-          </a:p>
-        </p:txBody>
-      </p:sp>
-      <p:sp>
-        <p:nvSpPr>
-          <p:cNvPr id="5" name="Footer Placeholder 4">
-            <a:extLst>
-              <a:ext uri="{FF2B5EF4-FFF2-40B4-BE49-F238E27FC236}">
-                <a16:creationId xmlns:a16="http://schemas.microsoft.com/office/drawing/2014/main" id="{094194AD-0673-FD4F-B206-29898F9A0080}"/>
-              </a:ext>
-            </a:extLst>
-          </p:cNvPr>
-          <p:cNvSpPr>
-            <a:spLocks noGrp="1"/>
-          </p:cNvSpPr>
-          <p:nvPr>
-            <p:ph type="ftr" sz="quarter" idx="3"/>
-          </p:nvPr>
-        </p:nvSpPr>
-        <p:spPr/>
-        <p:txBody>
-          <a:bodyPr/>
-          <a:lstStyle/>
-          <a:p>
-            <a:r>
-              <a:rPr lang="en-US"/>
-              <a:t>Dmitry Malyshev, Probabilistic catalogs</a:t>
-            </a:r>
-            <a:endParaRPr lang="en-US" dirty="0"/>
-          </a:p>
-        </p:txBody>
-      </p:sp>
-      <p:pic>
-        <p:nvPicPr>
-          <p:cNvPr id="7" name="Picture 6">
-            <a:extLst>
-              <a:ext uri="{FF2B5EF4-FFF2-40B4-BE49-F238E27FC236}">
-                <a16:creationId xmlns:a16="http://schemas.microsoft.com/office/drawing/2014/main" id="{A064B8EE-B11F-5F4D-8050-148B7EC8461D}"/>
-              </a:ext>
-            </a:extLst>
-          </p:cNvPr>
-          <p:cNvPicPr>
-            <a:picLocks noChangeAspect="1"/>
-          </p:cNvPicPr>
-          <p:nvPr/>
-        </p:nvPicPr>
-        <p:blipFill>
-          <a:blip r:embed="rId2"/>
-          <a:stretch>
-            <a:fillRect/>
-          </a:stretch>
-        </p:blipFill>
-        <p:spPr>
-          <a:xfrm>
-            <a:off x="300037" y="1905000"/>
-            <a:ext cx="5110163" cy="3193852"/>
-          </a:xfrm>
-          <a:prstGeom prst="rect">
-            <a:avLst/>
-          </a:prstGeom>
-        </p:spPr>
-      </p:pic>
-      <p:pic>
-        <p:nvPicPr>
-          <p:cNvPr id="9" name="Picture 8">
-            <a:extLst>
-              <a:ext uri="{FF2B5EF4-FFF2-40B4-BE49-F238E27FC236}">
-                <a16:creationId xmlns:a16="http://schemas.microsoft.com/office/drawing/2014/main" id="{70880977-C09C-E241-B6CD-47A0772F449D}"/>
-              </a:ext>
-            </a:extLst>
-          </p:cNvPr>
-          <p:cNvPicPr>
-            <a:picLocks noChangeAspect="1"/>
-          </p:cNvPicPr>
-          <p:nvPr/>
-        </p:nvPicPr>
-        <p:blipFill>
-          <a:blip r:embed="rId3"/>
-          <a:stretch>
-            <a:fillRect/>
-          </a:stretch>
-        </p:blipFill>
-        <p:spPr>
-          <a:xfrm>
-            <a:off x="5184776" y="4114801"/>
-            <a:ext cx="3657600" cy="2286000"/>
-          </a:xfrm>
-          <a:prstGeom prst="rect">
-            <a:avLst/>
-          </a:prstGeom>
-        </p:spPr>
-      </p:pic>
-    </p:spTree>
-    <p:extLst>
-      <p:ext uri="{BB962C8B-B14F-4D97-AF65-F5344CB8AC3E}">
-        <p14:creationId xmlns:p14="http://schemas.microsoft.com/office/powerpoint/2010/main" val="92563154"/>
-      </p:ext>
-    </p:extLst>
-  </p:cSld>
-  <p:clrMapOvr>
-    <a:masterClrMapping/>
-  </p:clrMapOvr>
-  <p:transition/>
-</p:sld>
-</file>
-
 <file path=ppt/slides/slide3.xml><?xml version="1.0" encoding="utf-8"?>
 <p:sld xmlns:a="http://schemas.openxmlformats.org/drawingml/2006/main" xmlns:r="http://schemas.openxmlformats.org/officeDocument/2006/relationships" xmlns:p="http://schemas.openxmlformats.org/presentationml/2006/main">
   <p:cSld>
@@ -11536,7 +11555,7 @@
           <p:cNvPr id="2" name="Title 1">
             <a:extLst>
               <a:ext uri="{FF2B5EF4-FFF2-40B4-BE49-F238E27FC236}">
-                <a16:creationId xmlns:a16="http://schemas.microsoft.com/office/drawing/2014/main" id="{AC971962-557B-FF41-A727-C358EAFA39FB}"/>
+                <a16:creationId xmlns:a16="http://schemas.microsoft.com/office/drawing/2014/main" id="{5082B5D6-8E28-E24C-BDBA-B07C988DA458}"/>
               </a:ext>
             </a:extLst>
           </p:cNvPr>
@@ -11554,7 +11573,7 @@
           <a:p>
             <a:r>
               <a:rPr lang="en-US" dirty="0"/>
-              <a:t>4FGL-DR2 features</a:t>
+              <a:t>NN domains</a:t>
             </a:r>
           </a:p>
         </p:txBody>
@@ -11564,7 +11583,7 @@
           <p:cNvPr id="3" name="Content Placeholder 2">
             <a:extLst>
               <a:ext uri="{FF2B5EF4-FFF2-40B4-BE49-F238E27FC236}">
-                <a16:creationId xmlns:a16="http://schemas.microsoft.com/office/drawing/2014/main" id="{6F84EB0B-A0FE-1145-B10D-A7990BD0F22D}"/>
+                <a16:creationId xmlns:a16="http://schemas.microsoft.com/office/drawing/2014/main" id="{4F2A6BF6-6BDD-2544-8678-9E758E3E7717}"/>
               </a:ext>
             </a:extLst>
           </p:cNvPr>
@@ -11582,7 +11601,7 @@
           <a:p>
             <a:r>
               <a:rPr lang="en-US" dirty="0"/>
-              <a:t>Features</a:t>
+              <a:t>The domains for NN are similar to LR, but the boundary is non-linear</a:t>
             </a:r>
           </a:p>
         </p:txBody>
@@ -11592,7 +11611,7 @@
           <p:cNvPr id="4" name="Slide Number Placeholder 3">
             <a:extLst>
               <a:ext uri="{FF2B5EF4-FFF2-40B4-BE49-F238E27FC236}">
-                <a16:creationId xmlns:a16="http://schemas.microsoft.com/office/drawing/2014/main" id="{C6ED1417-507A-E747-92C8-88DB2E10303A}"/>
+                <a16:creationId xmlns:a16="http://schemas.microsoft.com/office/drawing/2014/main" id="{04735917-ADCD-3745-BFAE-EA92B6327B28}"/>
               </a:ext>
             </a:extLst>
           </p:cNvPr>
@@ -11622,7 +11641,7 @@
           <p:cNvPr id="5" name="Footer Placeholder 4">
             <a:extLst>
               <a:ext uri="{FF2B5EF4-FFF2-40B4-BE49-F238E27FC236}">
-                <a16:creationId xmlns:a16="http://schemas.microsoft.com/office/drawing/2014/main" id="{4C655BC2-5274-DA4C-90E5-68C85149E8BC}"/>
+                <a16:creationId xmlns:a16="http://schemas.microsoft.com/office/drawing/2014/main" id="{094194AD-0673-FD4F-B206-29898F9A0080}"/>
               </a:ext>
             </a:extLst>
           </p:cNvPr>
@@ -11648,10 +11667,10 @@
       </p:sp>
       <p:pic>
         <p:nvPicPr>
-          <p:cNvPr id="9" name="Picture 8" descr="Text&#10;&#10;Description automatically generated with medium confidence">
-            <a:extLst>
-              <a:ext uri="{FF2B5EF4-FFF2-40B4-BE49-F238E27FC236}">
-                <a16:creationId xmlns:a16="http://schemas.microsoft.com/office/drawing/2014/main" id="{6D7B2DFE-9F42-7140-A56C-4933AB12A965}"/>
+          <p:cNvPr id="8" name="Grafik 7">
+            <a:extLst>
+              <a:ext uri="{FF2B5EF4-FFF2-40B4-BE49-F238E27FC236}">
+                <a16:creationId xmlns:a16="http://schemas.microsoft.com/office/drawing/2014/main" id="{055CA400-E857-40FB-BD1F-C5F09B399362}"/>
               </a:ext>
             </a:extLst>
           </p:cNvPr>
@@ -11668,8 +11687,38 @@
         </p:blipFill>
         <p:spPr>
           <a:xfrm>
-            <a:off x="2514600" y="1141414"/>
-            <a:ext cx="2667000" cy="3701955"/>
+            <a:off x="381000" y="1992068"/>
+            <a:ext cx="4953000" cy="3265732"/>
+          </a:xfrm>
+          <a:prstGeom prst="rect">
+            <a:avLst/>
+          </a:prstGeom>
+        </p:spPr>
+      </p:pic>
+      <p:pic>
+        <p:nvPicPr>
+          <p:cNvPr id="11" name="Grafik 10">
+            <a:extLst>
+              <a:ext uri="{FF2B5EF4-FFF2-40B4-BE49-F238E27FC236}">
+                <a16:creationId xmlns:a16="http://schemas.microsoft.com/office/drawing/2014/main" id="{B3AD0D32-2C39-4999-8746-4D6AC2F460A9}"/>
+              </a:ext>
+            </a:extLst>
+          </p:cNvPr>
+          <p:cNvPicPr>
+            <a:picLocks noChangeAspect="1"/>
+          </p:cNvPicPr>
+          <p:nvPr/>
+        </p:nvPicPr>
+        <p:blipFill>
+          <a:blip r:embed="rId3"/>
+          <a:stretch>
+            <a:fillRect/>
+          </a:stretch>
+        </p:blipFill>
+        <p:spPr>
+          <a:xfrm>
+            <a:off x="5334001" y="3657600"/>
+            <a:ext cx="3657600" cy="2743201"/>
           </a:xfrm>
           <a:prstGeom prst="rect">
             <a:avLst/>
@@ -11679,7 +11728,7 @@
     </p:spTree>
     <p:extLst>
       <p:ext uri="{BB962C8B-B14F-4D97-AF65-F5344CB8AC3E}">
-        <p14:creationId xmlns:p14="http://schemas.microsoft.com/office/powerpoint/2010/main" val="1040513554"/>
+        <p14:creationId xmlns:p14="http://schemas.microsoft.com/office/powerpoint/2010/main" val="92563154"/>
       </p:ext>
     </p:extLst>
   </p:cSld>
@@ -12371,7 +12420,15 @@
             <a:pPr lvl="1"/>
             <a:r>
               <a:rPr lang="en-US" dirty="0"/>
-              <a:t>Many ML algorithms can take source features as input and output probabilities of classes. We will use</a:t>
+              <a:t>Many ML algorithms can take source features as input and output probabilities of classes. We will use (</a:t>
+            </a:r>
+            <a:r>
+              <a:rPr lang="en-US" dirty="0" err="1"/>
+              <a:t>sklearn</a:t>
+            </a:r>
+            <a:r>
+              <a:rPr lang="en-US" dirty="0"/>
+              <a:t>):</a:t>
             </a:r>
           </a:p>
           <a:p>
@@ -12577,7 +12634,7 @@
             <a:pPr lvl="1"/>
             <a:r>
               <a:rPr lang="en-US" dirty="0"/>
-              <a:t>Use uncorrelated features (correlation </a:t>
+              <a:t>Use ‘uncorrelated’ features (correlation </a:t>
             </a:r>
             <a:br>
               <a:rPr lang="en-US" dirty="0"/>
@@ -12652,7 +12709,7 @@
         </p:blipFill>
         <p:spPr>
           <a:xfrm>
-            <a:off x="6160708" y="4167045"/>
+            <a:off x="6170760" y="4242683"/>
             <a:ext cx="2357816" cy="2296230"/>
           </a:xfrm>
           <a:prstGeom prst="rect">
@@ -12720,6 +12777,50 @@
           </a:prstGeom>
         </p:spPr>
       </p:pic>
+      <p:sp>
+        <p:nvSpPr>
+          <p:cNvPr id="5" name="Pfeil: nach rechts 4">
+            <a:extLst>
+              <a:ext uri="{FF2B5EF4-FFF2-40B4-BE49-F238E27FC236}">
+                <a16:creationId xmlns:a16="http://schemas.microsoft.com/office/drawing/2014/main" id="{6DA185DB-65A8-4650-B2B7-6DE6FF3093DE}"/>
+              </a:ext>
+            </a:extLst>
+          </p:cNvPr>
+          <p:cNvSpPr/>
+          <p:nvPr/>
+        </p:nvSpPr>
+        <p:spPr>
+          <a:xfrm>
+            <a:off x="4792532" y="5315160"/>
+            <a:ext cx="978408" cy="484632"/>
+          </a:xfrm>
+          <a:prstGeom prst="rightArrow">
+            <a:avLst/>
+          </a:prstGeom>
+        </p:spPr>
+        <p:style>
+          <a:lnRef idx="1">
+            <a:schemeClr val="accent1"/>
+          </a:lnRef>
+          <a:fillRef idx="3">
+            <a:schemeClr val="accent1"/>
+          </a:fillRef>
+          <a:effectRef idx="2">
+            <a:schemeClr val="accent1"/>
+          </a:effectRef>
+          <a:fontRef idx="minor">
+            <a:schemeClr val="lt1"/>
+          </a:fontRef>
+        </p:style>
+        <p:txBody>
+          <a:bodyPr rtlCol="0" anchor="ctr"/>
+          <a:lstStyle/>
+          <a:p>
+            <a:pPr algn="ctr"/>
+            <a:endParaRPr lang="en-DE"/>
+          </a:p>
+        </p:txBody>
+      </p:sp>
     </p:spTree>
     <p:extLst>
       <p:ext uri="{BB962C8B-B14F-4D97-AF65-F5344CB8AC3E}">
@@ -12814,14 +12915,14 @@
             <a:pPr lvl="1"/>
             <a:r>
               <a:rPr lang="en-US" dirty="0"/>
-              <a:t>We use associated AGNs and PSRs (2-class) or all associated sources (3-class) and split them in </a:t>
-            </a:r>
-            <a:br>
-              <a:rPr lang="en-US" dirty="0"/>
-            </a:br>
-            <a:r>
-              <a:rPr lang="en-US" dirty="0"/>
-              <a:t>70 / 30% for training / testing</a:t>
+              <a:t>Use associated AGNs and PSRs (2-class) or all associated sources (3-class)</a:t>
+            </a:r>
+          </a:p>
+          <a:p>
+            <a:pPr lvl="1"/>
+            <a:r>
+              <a:rPr lang="en-US" dirty="0"/>
+              <a:t>Split in 70 / 30% for training / testing.</a:t>
             </a:r>
           </a:p>
           <a:p>
@@ -12930,8 +13031,8 @@
         </p:blipFill>
         <p:spPr>
           <a:xfrm>
-            <a:off x="38100" y="4127140"/>
-            <a:ext cx="4724400" cy="2420315"/>
+            <a:off x="108008" y="4176319"/>
+            <a:ext cx="4724400" cy="2347913"/>
           </a:xfrm>
           <a:prstGeom prst="rect">
             <a:avLst/>
@@ -12960,8 +13061,8 @@
         </p:blipFill>
         <p:spPr>
           <a:xfrm>
-            <a:off x="4381501" y="4127140"/>
-            <a:ext cx="4724399" cy="2420314"/>
+            <a:off x="4419601" y="4190999"/>
+            <a:ext cx="4724399" cy="2347913"/>
           </a:xfrm>
           <a:prstGeom prst="rect">
             <a:avLst/>
@@ -13022,8 +13123,13 @@
           <a:p>
             <a:r>
               <a:rPr lang="en-US" dirty="0"/>
-              <a:t>Feature importance</a:t>
-            </a:r>
+              <a:t>Feature </a:t>
+            </a:r>
+            <a:r>
+              <a:rPr lang="en-US" dirty="0" err="1"/>
+              <a:t>Importances</a:t>
+            </a:r>
+            <a:endParaRPr lang="en-US" dirty="0"/>
           </a:p>
         </p:txBody>
       </p:sp>
@@ -13050,7 +13156,7 @@
           <a:p>
             <a:r>
               <a:rPr lang="en-US" dirty="0"/>
-              <a:t>Feature importance for two RF algorithms</a:t>
+              <a:t>Feature importance for two RF algorithms/BDT</a:t>
             </a:r>
           </a:p>
           <a:p>
@@ -13084,15 +13190,42 @@
             <a:endParaRPr lang="en-US" dirty="0"/>
           </a:p>
           <a:p>
-            <a:r>
-              <a:rPr lang="en-US" dirty="0"/>
-              <a:t>Significance of curvature is the most important parameter</a:t>
-            </a:r>
-          </a:p>
-          <a:p>
-            <a:r>
-              <a:rPr lang="en-US" dirty="0"/>
-              <a:t>Latitude and longitude are the least important</a:t>
+            <a:pPr marL="0" indent="0">
+              <a:buNone/>
+            </a:pPr>
+            <a:r>
+              <a:rPr lang="en-US" b="0" dirty="0">
+                <a:ln w="0"/>
+                <a:effectLst>
+                  <a:outerShdw blurRad="38100" dist="19050" dir="2700000" algn="tl" rotWithShape="0">
+                    <a:schemeClr val="dk1">
+                      <a:alpha val="40000"/>
+                    </a:schemeClr>
+                  </a:outerShdw>
+                </a:effectLst>
+              </a:rPr>
+              <a:t>         Significance of curvature is the most important parameter</a:t>
+            </a:r>
+          </a:p>
+          <a:p>
+            <a:pPr marL="457118" lvl="1" indent="0">
+              <a:buNone/>
+            </a:pPr>
+            <a:r>
+              <a:rPr lang="en-US" b="0" dirty="0">
+                <a:ln w="0"/>
+                <a:solidFill>
+                  <a:schemeClr val="tx1"/>
+                </a:solidFill>
+                <a:effectLst>
+                  <a:outerShdw blurRad="38100" dist="19050" dir="2700000" algn="tl" rotWithShape="0">
+                    <a:schemeClr val="dk1">
+                      <a:alpha val="40000"/>
+                    </a:schemeClr>
+                  </a:outerShdw>
+                </a:effectLst>
+              </a:rPr>
+              <a:t>   Latitude and Longitude are the least important</a:t>
             </a:r>
           </a:p>
         </p:txBody>
@@ -13180,6 +13313,80 @@
           <a:xfrm>
             <a:off x="990600" y="1930400"/>
             <a:ext cx="6337300" cy="2997200"/>
+          </a:xfrm>
+          <a:prstGeom prst="rect">
+            <a:avLst/>
+          </a:prstGeom>
+        </p:spPr>
+      </p:pic>
+      <p:sp>
+        <p:nvSpPr>
+          <p:cNvPr id="6" name="Pfeil: nach rechts 5">
+            <a:extLst>
+              <a:ext uri="{FF2B5EF4-FFF2-40B4-BE49-F238E27FC236}">
+                <a16:creationId xmlns:a16="http://schemas.microsoft.com/office/drawing/2014/main" id="{805DA8B7-DBD6-4ED6-997A-D16660B82292}"/>
+              </a:ext>
+            </a:extLst>
+          </p:cNvPr>
+          <p:cNvSpPr/>
+          <p:nvPr/>
+        </p:nvSpPr>
+        <p:spPr>
+          <a:xfrm>
+            <a:off x="607300" y="5354853"/>
+            <a:ext cx="593724" cy="484632"/>
+          </a:xfrm>
+          <a:prstGeom prst="rightArrow">
+            <a:avLst/>
+          </a:prstGeom>
+        </p:spPr>
+        <p:style>
+          <a:lnRef idx="1">
+            <a:schemeClr val="accent1"/>
+          </a:lnRef>
+          <a:fillRef idx="3">
+            <a:schemeClr val="accent1"/>
+          </a:fillRef>
+          <a:effectRef idx="2">
+            <a:schemeClr val="accent1"/>
+          </a:effectRef>
+          <a:fontRef idx="minor">
+            <a:schemeClr val="lt1"/>
+          </a:fontRef>
+        </p:style>
+        <p:txBody>
+          <a:bodyPr rtlCol="0" anchor="ctr"/>
+          <a:lstStyle/>
+          <a:p>
+            <a:pPr algn="ctr"/>
+            <a:endParaRPr lang="en-DE"/>
+          </a:p>
+        </p:txBody>
+      </p:sp>
+      <p:pic>
+        <p:nvPicPr>
+          <p:cNvPr id="9" name="Grafik 8" descr="Ein Bild, das Tisch enthält.&#10;&#10;Automatisch generierte Beschreibung">
+            <a:extLst>
+              <a:ext uri="{FF2B5EF4-FFF2-40B4-BE49-F238E27FC236}">
+                <a16:creationId xmlns:a16="http://schemas.microsoft.com/office/drawing/2014/main" id="{E0D951A7-37D6-4774-836D-3AFFF42938CF}"/>
+              </a:ext>
+            </a:extLst>
+          </p:cNvPr>
+          <p:cNvPicPr>
+            <a:picLocks noChangeAspect="1"/>
+          </p:cNvPicPr>
+          <p:nvPr/>
+        </p:nvPicPr>
+        <p:blipFill>
+          <a:blip r:embed="rId3"/>
+          <a:stretch>
+            <a:fillRect/>
+          </a:stretch>
+        </p:blipFill>
+        <p:spPr>
+          <a:xfrm>
+            <a:off x="7239000" y="1921079"/>
+            <a:ext cx="1124107" cy="3006521"/>
           </a:xfrm>
           <a:prstGeom prst="rect">
             <a:avLst/>
@@ -13280,7 +13487,7 @@
             <a:pPr lvl="1"/>
             <a:r>
               <a:rPr lang="en-US" dirty="0"/>
-              <a:t>PSRs are much less numerous as AGNs (the classes are imbalanced)</a:t>
+              <a:t>PSRs are much less numerous as AGNs (the classes are imbalanced): 166 vs 1739.</a:t>
             </a:r>
           </a:p>
           <a:p>
@@ -13367,10 +13574,10 @@
       </p:sp>
       <p:pic>
         <p:nvPicPr>
-          <p:cNvPr id="7" name="Picture 6">
-            <a:extLst>
-              <a:ext uri="{FF2B5EF4-FFF2-40B4-BE49-F238E27FC236}">
-                <a16:creationId xmlns:a16="http://schemas.microsoft.com/office/drawing/2014/main" id="{4686921F-8C32-6D42-8203-530684422ED3}"/>
+          <p:cNvPr id="11" name="Grafik 10">
+            <a:extLst>
+              <a:ext uri="{FF2B5EF4-FFF2-40B4-BE49-F238E27FC236}">
+                <a16:creationId xmlns:a16="http://schemas.microsoft.com/office/drawing/2014/main" id="{8B0FB7E6-0968-42AD-B566-CFAC0715E30C}"/>
               </a:ext>
             </a:extLst>
           </p:cNvPr>
@@ -13387,8 +13594,8 @@
         </p:blipFill>
         <p:spPr>
           <a:xfrm>
-            <a:off x="0" y="3599657"/>
-            <a:ext cx="4481829" cy="2801143"/>
+            <a:off x="533400" y="3571327"/>
+            <a:ext cx="4114800" cy="2905674"/>
           </a:xfrm>
           <a:prstGeom prst="rect">
             <a:avLst/>
@@ -13397,10 +13604,10 @@
       </p:pic>
       <p:pic>
         <p:nvPicPr>
-          <p:cNvPr id="9" name="Picture 8">
-            <a:extLst>
-              <a:ext uri="{FF2B5EF4-FFF2-40B4-BE49-F238E27FC236}">
-                <a16:creationId xmlns:a16="http://schemas.microsoft.com/office/drawing/2014/main" id="{16247B0A-F3E0-D54A-B01D-17A24A9171B8}"/>
+          <p:cNvPr id="13" name="Grafik 12">
+            <a:extLst>
+              <a:ext uri="{FF2B5EF4-FFF2-40B4-BE49-F238E27FC236}">
+                <a16:creationId xmlns:a16="http://schemas.microsoft.com/office/drawing/2014/main" id="{33A60CFF-A329-4CA0-8F4D-17CB708FA8E0}"/>
               </a:ext>
             </a:extLst>
           </p:cNvPr>
@@ -13417,8 +13624,8 @@
         </p:blipFill>
         <p:spPr>
           <a:xfrm>
-            <a:off x="4312285" y="3599657"/>
-            <a:ext cx="4481829" cy="2801143"/>
+            <a:off x="4724399" y="3571328"/>
+            <a:ext cx="4343401" cy="2905674"/>
           </a:xfrm>
           <a:prstGeom prst="rect">
             <a:avLst/>
@@ -13534,7 +13741,7 @@
           <a:p>
             <a:r>
               <a:rPr lang="en-US" dirty="0"/>
-              <a:t>For the probabilistic catalog, we are not going to choose “the best” method, but rather report the probabilities obtained with all four methods</a:t>
+              <a:t>For the probabilistic catalog, we are not going to choose “the best” method, but rather report the probabilities obtained with all four (eight) methods</a:t>
             </a:r>
           </a:p>
           <a:p>

</xml_diff>

<commit_message>
modified backup slides for ECAP ML presentation
</commit_message>
<xml_diff>
--- a/presentations/2021-02-Fermi_prob_catalog_ECAP_ML.pptx
+++ b/presentations/2021-02-Fermi_prob_catalog_ECAP_ML.pptx
@@ -273,7 +273,7 @@
             <a:fld id="{3189ADB2-8830-3E4F-9C21-386BBEFF5ECC}" type="datetimeFigureOut">
               <a:rPr lang="en-US" smtClean="0"/>
               <a:pPr/>
-              <a:t>2/23/2021</a:t>
+              <a:t>2/24/21</a:t>
             </a:fld>
             <a:endParaRPr lang="en-US"/>
           </a:p>
@@ -340,7 +340,7 @@
             <a:fld id="{331B9277-206D-B84E-BFFB-205D88D02D6E}" type="slidenum">
               <a:rPr lang="en-US" smtClean="0"/>
               <a:pPr/>
-              <a:t>‹Nr.›</a:t>
+              <a:t>‹#›</a:t>
             </a:fld>
             <a:endParaRPr lang="en-US"/>
           </a:p>
@@ -441,7 +441,7 @@
             <a:fld id="{C85F260B-6123-154B-904A-A1AB92F0D5FE}" type="datetimeFigureOut">
               <a:rPr lang="en-US" smtClean="0"/>
               <a:pPr/>
-              <a:t>2/22/2021</a:t>
+              <a:t>2/24/21</a:t>
             </a:fld>
             <a:endParaRPr lang="en-US"/>
           </a:p>
@@ -600,7 +600,7 @@
             <a:fld id="{D6757CD8-65B6-324C-A34B-D149102AC0AE}" type="slidenum">
               <a:rPr lang="en-US" smtClean="0"/>
               <a:pPr/>
-              <a:t>‹Nr.›</a:t>
+              <a:t>‹#›</a:t>
             </a:fld>
             <a:endParaRPr lang="en-US"/>
           </a:p>
@@ -1161,7 +1161,7 @@
           <a:p>
             <a:fld id="{103471C4-0DF0-FF4F-BCCC-44D2780D953F}" type="datetime1">
               <a:rPr lang="en-US" smtClean="0"/>
-              <a:t>2/22/2021</a:t>
+              <a:t>2/24/21</a:t>
             </a:fld>
             <a:endParaRPr lang="en-US"/>
           </a:p>
@@ -1189,7 +1189,7 @@
             <a:fld id="{2BE1FEC3-8823-1349-926D-AB6C326E7D50}" type="slidenum">
               <a:rPr lang="en-US"/>
               <a:pPr/>
-              <a:t>‹Nr.›</a:t>
+              <a:t>‹#›</a:t>
             </a:fld>
             <a:endParaRPr lang="en-US"/>
           </a:p>
@@ -1607,7 +1607,7 @@
           <a:p>
             <a:fld id="{D47E2586-09A2-8443-97E9-9E1CC8856BFD}" type="datetime1">
               <a:rPr lang="en-US" smtClean="0"/>
-              <a:t>2/22/2021</a:t>
+              <a:t>2/24/21</a:t>
             </a:fld>
             <a:endParaRPr lang="en-US"/>
           </a:p>
@@ -1635,7 +1635,7 @@
             <a:fld id="{33900595-0495-7D41-9213-486E137F5EBE}" type="slidenum">
               <a:rPr lang="en-US"/>
               <a:pPr/>
-              <a:t>‹Nr.›</a:t>
+              <a:t>‹#›</a:t>
             </a:fld>
             <a:endParaRPr lang="en-US"/>
           </a:p>
@@ -2065,7 +2065,7 @@
           <a:p>
             <a:fld id="{E8002B35-DFF4-9049-843D-44A6085D396E}" type="datetime1">
               <a:rPr lang="en-US" smtClean="0"/>
-              <a:t>2/22/2021</a:t>
+              <a:t>2/24/21</a:t>
             </a:fld>
             <a:endParaRPr lang="en-US"/>
           </a:p>
@@ -2093,7 +2093,7 @@
             <a:fld id="{8B105637-6452-3041-BF3C-C91CFF1D2D73}" type="slidenum">
               <a:rPr lang="en-US"/>
               <a:pPr/>
-              <a:t>‹Nr.›</a:t>
+              <a:t>‹#›</a:t>
             </a:fld>
             <a:endParaRPr lang="en-US"/>
           </a:p>
@@ -2216,7 +2216,7 @@
           <a:p>
             <a:fld id="{0F057E37-0DE7-3940-BEF3-BD3052280F27}" type="datetime1">
               <a:rPr lang="en-US" smtClean="0"/>
-              <a:t>2/22/2021</a:t>
+              <a:t>2/24/21</a:t>
             </a:fld>
             <a:endParaRPr lang="en-US"/>
           </a:p>
@@ -2244,7 +2244,7 @@
             <a:fld id="{3B1C5E0C-B6CC-CC4D-A1D7-431A14614F40}" type="slidenum">
               <a:rPr lang="en-US"/>
               <a:pPr/>
-              <a:t>‹Nr.›</a:t>
+              <a:t>‹#›</a:t>
             </a:fld>
             <a:endParaRPr lang="en-US"/>
           </a:p>
@@ -2345,7 +2345,7 @@
           <a:p>
             <a:fld id="{779F7A2C-FB4C-AC44-A88F-A5CBCF0D32EC}" type="datetime1">
               <a:rPr lang="en-US" smtClean="0"/>
-              <a:t>2/22/2021</a:t>
+              <a:t>2/24/21</a:t>
             </a:fld>
             <a:endParaRPr lang="en-US"/>
           </a:p>
@@ -2373,7 +2373,7 @@
             <a:fld id="{11FED4F5-065D-3F47-BC26-E608D4320160}" type="slidenum">
               <a:rPr lang="en-US"/>
               <a:pPr/>
-              <a:t>‹Nr.›</a:t>
+              <a:t>‹#›</a:t>
             </a:fld>
             <a:endParaRPr lang="en-US"/>
           </a:p>
@@ -2654,7 +2654,7 @@
           <a:p>
             <a:fld id="{F522DC46-DCD4-5941-8454-39336897E19D}" type="datetime1">
               <a:rPr lang="en-US" smtClean="0"/>
-              <a:t>2/22/2021</a:t>
+              <a:t>2/24/21</a:t>
             </a:fld>
             <a:endParaRPr lang="en-US"/>
           </a:p>
@@ -2682,7 +2682,7 @@
             <a:fld id="{8BC245A3-4723-5549-B5C0-92DD3A2F6AFA}" type="slidenum">
               <a:rPr lang="en-US"/>
               <a:pPr/>
-              <a:t>‹Nr.›</a:t>
+              <a:t>‹#›</a:t>
             </a:fld>
             <a:endParaRPr lang="en-US"/>
           </a:p>
@@ -3029,14 +3029,14 @@
           </a:ln>
           <a:extLst>
             <a:ext uri="{909E8E84-426E-40dd-AFC4-6F175D3DCCD1}">
-              <a14:hiddenFill xmlns="" xmlns:a14="http://schemas.microsoft.com/office/drawing/2010/main">
+              <a14:hiddenFill xmlns:a14="http://schemas.microsoft.com/office/drawing/2010/main" xmlns="">
                 <a:solidFill>
                   <a:srgbClr val="FFFFFF"/>
                 </a:solidFill>
               </a14:hiddenFill>
             </a:ext>
             <a:ext uri="{91240B29-F687-4f45-9708-019B960494DF}">
-              <a14:hiddenLine xmlns="" xmlns:a14="http://schemas.microsoft.com/office/drawing/2010/main" w="9525">
+              <a14:hiddenLine xmlns:a14="http://schemas.microsoft.com/office/drawing/2010/main" xmlns="" w="9525">
                 <a:solidFill>
                   <a:srgbClr val="000000"/>
                 </a:solidFill>
@@ -3046,7 +3046,7 @@
               </a14:hiddenLine>
             </a:ext>
             <a:ext uri="{FAA26D3D-D897-4be2-8F04-BA451C77F1D7}">
-              <ma14:placeholderFlag xmlns="" xmlns:ma14="http://schemas.microsoft.com/office/mac/drawingml/2011/main" val="1"/>
+              <ma14:placeholderFlag xmlns:ma14="http://schemas.microsoft.com/office/mac/drawingml/2011/main" xmlns="" val="1"/>
             </a:ext>
           </a:extLst>
         </p:spPr>
@@ -3222,7 +3222,7 @@
           <a:p>
             <a:fld id="{04DC5BFA-818F-8D40-A035-7726C59AF3B0}" type="datetime1">
               <a:rPr lang="en-US" smtClean="0"/>
-              <a:t>2/22/2021</a:t>
+              <a:t>2/24/21</a:t>
             </a:fld>
             <a:endParaRPr lang="en-US"/>
           </a:p>
@@ -3266,7 +3266,7 @@
             <a:fld id="{C0E3A5C4-944E-9249-BF19-30D09D029497}" type="slidenum">
               <a:rPr lang="en-US"/>
               <a:pPr/>
-              <a:t>‹Nr.›</a:t>
+              <a:t>‹#›</a:t>
             </a:fld>
             <a:endParaRPr lang="en-US"/>
           </a:p>
@@ -4055,14 +4055,14 @@
           </a:ln>
           <a:extLst>
             <a:ext uri="{909E8E84-426E-40dd-AFC4-6F175D3DCCD1}">
-              <a14:hiddenFill xmlns="" xmlns:a14="http://schemas.microsoft.com/office/drawing/2010/main">
+              <a14:hiddenFill xmlns:a14="http://schemas.microsoft.com/office/drawing/2010/main" xmlns="">
                 <a:solidFill>
                   <a:srgbClr val="FFFFFF"/>
                 </a:solidFill>
               </a14:hiddenFill>
             </a:ext>
             <a:ext uri="{91240B29-F687-4f45-9708-019B960494DF}">
-              <a14:hiddenLine xmlns="" xmlns:a14="http://schemas.microsoft.com/office/drawing/2010/main" w="9525">
+              <a14:hiddenLine xmlns:a14="http://schemas.microsoft.com/office/drawing/2010/main" xmlns="" w="9525">
                 <a:solidFill>
                   <a:srgbClr val="000000"/>
                 </a:solidFill>
@@ -4072,7 +4072,7 @@
               </a14:hiddenLine>
             </a:ext>
             <a:ext uri="{FAA26D3D-D897-4be2-8F04-BA451C77F1D7}">
-              <ma14:placeholderFlag xmlns="" xmlns:ma14="http://schemas.microsoft.com/office/mac/drawingml/2011/main" val="1"/>
+              <ma14:placeholderFlag xmlns:ma14="http://schemas.microsoft.com/office/mac/drawingml/2011/main" xmlns="" val="1"/>
             </a:ext>
           </a:extLst>
         </p:spPr>
@@ -12133,7 +12133,7 @@
           <a:p>
             <a:r>
               <a:rPr lang="en-US" dirty="0"/>
-              <a:t>Some references and our work plan</a:t>
+              <a:t>Some references</a:t>
             </a:r>
           </a:p>
         </p:txBody>
@@ -12248,47 +12248,6 @@
                 </a:solidFill>
               </a:rPr>
               <a:t> et al (2016)</a:t>
-            </a:r>
-          </a:p>
-          <a:p>
-            <a:r>
-              <a:rPr lang="en-US" dirty="0"/>
-              <a:t>We use ML for the construction of probabilistic catalogs based on the 3FGL and 4FGL-DR2 catalogs</a:t>
-            </a:r>
-          </a:p>
-          <a:p>
-            <a:pPr lvl="1"/>
-            <a:r>
-              <a:rPr lang="en-US" dirty="0"/>
-              <a:t>Use 2-class (AGN, pulsars) or 3-class (add other sources) classification</a:t>
-            </a:r>
-          </a:p>
-          <a:p>
-            <a:pPr lvl="1"/>
-            <a:r>
-              <a:rPr lang="en-US" dirty="0"/>
-              <a:t>Test predictions for 3FGL using 4FGL-DR2</a:t>
-            </a:r>
-          </a:p>
-          <a:p>
-            <a:pPr lvl="1"/>
-            <a:r>
-              <a:rPr lang="en-US" dirty="0"/>
-              <a:t>Keep results of all ML algorithms (gives syst. uncertainty)</a:t>
-            </a:r>
-          </a:p>
-          <a:p>
-            <a:pPr lvl="1"/>
-            <a:r>
-              <a:rPr lang="en-US" dirty="0"/>
-              <a:t>Show examples of populations studies: distributions as a function of flux, latitude, or longitude</a:t>
-            </a:r>
-          </a:p>
-          <a:p>
-            <a:pPr lvl="2"/>
-            <a:r>
-              <a:rPr lang="en-US" sz="1600" dirty="0"/>
-              <a:t>2-class: correct for presence of other sources (not PSRs or AGNs)</a:t>
             </a:r>
           </a:p>
         </p:txBody>

</xml_diff>

<commit_message>
changed table for cosglon
</commit_message>
<xml_diff>
--- a/presentations/2021-02-Fermi_prob_catalog_ECAP_ML.pptx
+++ b/presentations/2021-02-Fermi_prob_catalog_ECAP_ML.pptx
@@ -273,7 +273,7 @@
             <a:fld id="{3189ADB2-8830-3E4F-9C21-386BBEFF5ECC}" type="datetimeFigureOut">
               <a:rPr lang="en-US" smtClean="0"/>
               <a:pPr/>
-              <a:t>2/24/21</a:t>
+              <a:t>2/24/2021</a:t>
             </a:fld>
             <a:endParaRPr lang="en-US"/>
           </a:p>
@@ -340,7 +340,7 @@
             <a:fld id="{331B9277-206D-B84E-BFFB-205D88D02D6E}" type="slidenum">
               <a:rPr lang="en-US" smtClean="0"/>
               <a:pPr/>
-              <a:t>‹#›</a:t>
+              <a:t>‹Nr.›</a:t>
             </a:fld>
             <a:endParaRPr lang="en-US"/>
           </a:p>
@@ -441,7 +441,7 @@
             <a:fld id="{C85F260B-6123-154B-904A-A1AB92F0D5FE}" type="datetimeFigureOut">
               <a:rPr lang="en-US" smtClean="0"/>
               <a:pPr/>
-              <a:t>2/24/21</a:t>
+              <a:t>2/24/2021</a:t>
             </a:fld>
             <a:endParaRPr lang="en-US"/>
           </a:p>
@@ -600,7 +600,7 @@
             <a:fld id="{D6757CD8-65B6-324C-A34B-D149102AC0AE}" type="slidenum">
               <a:rPr lang="en-US" smtClean="0"/>
               <a:pPr/>
-              <a:t>‹#›</a:t>
+              <a:t>‹Nr.›</a:t>
             </a:fld>
             <a:endParaRPr lang="en-US"/>
           </a:p>
@@ -1161,7 +1161,7 @@
           <a:p>
             <a:fld id="{103471C4-0DF0-FF4F-BCCC-44D2780D953F}" type="datetime1">
               <a:rPr lang="en-US" smtClean="0"/>
-              <a:t>2/24/21</a:t>
+              <a:t>2/24/2021</a:t>
             </a:fld>
             <a:endParaRPr lang="en-US"/>
           </a:p>
@@ -1189,7 +1189,7 @@
             <a:fld id="{2BE1FEC3-8823-1349-926D-AB6C326E7D50}" type="slidenum">
               <a:rPr lang="en-US"/>
               <a:pPr/>
-              <a:t>‹#›</a:t>
+              <a:t>‹Nr.›</a:t>
             </a:fld>
             <a:endParaRPr lang="en-US"/>
           </a:p>
@@ -1607,7 +1607,7 @@
           <a:p>
             <a:fld id="{D47E2586-09A2-8443-97E9-9E1CC8856BFD}" type="datetime1">
               <a:rPr lang="en-US" smtClean="0"/>
-              <a:t>2/24/21</a:t>
+              <a:t>2/24/2021</a:t>
             </a:fld>
             <a:endParaRPr lang="en-US"/>
           </a:p>
@@ -1635,7 +1635,7 @@
             <a:fld id="{33900595-0495-7D41-9213-486E137F5EBE}" type="slidenum">
               <a:rPr lang="en-US"/>
               <a:pPr/>
-              <a:t>‹#›</a:t>
+              <a:t>‹Nr.›</a:t>
             </a:fld>
             <a:endParaRPr lang="en-US"/>
           </a:p>
@@ -2065,7 +2065,7 @@
           <a:p>
             <a:fld id="{E8002B35-DFF4-9049-843D-44A6085D396E}" type="datetime1">
               <a:rPr lang="en-US" smtClean="0"/>
-              <a:t>2/24/21</a:t>
+              <a:t>2/24/2021</a:t>
             </a:fld>
             <a:endParaRPr lang="en-US"/>
           </a:p>
@@ -2093,7 +2093,7 @@
             <a:fld id="{8B105637-6452-3041-BF3C-C91CFF1D2D73}" type="slidenum">
               <a:rPr lang="en-US"/>
               <a:pPr/>
-              <a:t>‹#›</a:t>
+              <a:t>‹Nr.›</a:t>
             </a:fld>
             <a:endParaRPr lang="en-US"/>
           </a:p>
@@ -2216,7 +2216,7 @@
           <a:p>
             <a:fld id="{0F057E37-0DE7-3940-BEF3-BD3052280F27}" type="datetime1">
               <a:rPr lang="en-US" smtClean="0"/>
-              <a:t>2/24/21</a:t>
+              <a:t>2/24/2021</a:t>
             </a:fld>
             <a:endParaRPr lang="en-US"/>
           </a:p>
@@ -2244,7 +2244,7 @@
             <a:fld id="{3B1C5E0C-B6CC-CC4D-A1D7-431A14614F40}" type="slidenum">
               <a:rPr lang="en-US"/>
               <a:pPr/>
-              <a:t>‹#›</a:t>
+              <a:t>‹Nr.›</a:t>
             </a:fld>
             <a:endParaRPr lang="en-US"/>
           </a:p>
@@ -2345,7 +2345,7 @@
           <a:p>
             <a:fld id="{779F7A2C-FB4C-AC44-A88F-A5CBCF0D32EC}" type="datetime1">
               <a:rPr lang="en-US" smtClean="0"/>
-              <a:t>2/24/21</a:t>
+              <a:t>2/24/2021</a:t>
             </a:fld>
             <a:endParaRPr lang="en-US"/>
           </a:p>
@@ -2373,7 +2373,7 @@
             <a:fld id="{11FED4F5-065D-3F47-BC26-E608D4320160}" type="slidenum">
               <a:rPr lang="en-US"/>
               <a:pPr/>
-              <a:t>‹#›</a:t>
+              <a:t>‹Nr.›</a:t>
             </a:fld>
             <a:endParaRPr lang="en-US"/>
           </a:p>
@@ -2654,7 +2654,7 @@
           <a:p>
             <a:fld id="{F522DC46-DCD4-5941-8454-39336897E19D}" type="datetime1">
               <a:rPr lang="en-US" smtClean="0"/>
-              <a:t>2/24/21</a:t>
+              <a:t>2/24/2021</a:t>
             </a:fld>
             <a:endParaRPr lang="en-US"/>
           </a:p>
@@ -2682,7 +2682,7 @@
             <a:fld id="{8BC245A3-4723-5549-B5C0-92DD3A2F6AFA}" type="slidenum">
               <a:rPr lang="en-US"/>
               <a:pPr/>
-              <a:t>‹#›</a:t>
+              <a:t>‹Nr.›</a:t>
             </a:fld>
             <a:endParaRPr lang="en-US"/>
           </a:p>
@@ -3222,7 +3222,7 @@
           <a:p>
             <a:fld id="{04DC5BFA-818F-8D40-A035-7726C59AF3B0}" type="datetime1">
               <a:rPr lang="en-US" smtClean="0"/>
-              <a:t>2/24/21</a:t>
+              <a:t>2/24/2021</a:t>
             </a:fld>
             <a:endParaRPr lang="en-US"/>
           </a:p>
@@ -3266,7 +3266,7 @@
             <a:fld id="{C0E3A5C4-944E-9249-BF19-30D09D029497}" type="slidenum">
               <a:rPr lang="en-US"/>
               <a:pPr/>
-              <a:t>‹#›</a:t>
+              <a:t>‹Nr.›</a:t>
             </a:fld>
             <a:endParaRPr lang="en-US"/>
           </a:p>
@@ -4687,7 +4687,7 @@
           <a:p>
             <a:r>
               <a:rPr lang="en-US" dirty="0"/>
-              <a:t>Non-AGN or PSR sources (denoted now by OTHER class) are present among unassociated sources</a:t>
+              <a:t>Non-AGN or Non-PSR sources (denoted now by OTHER class) are present among unassociated sources</a:t>
             </a:r>
           </a:p>
           <a:p>
@@ -5986,51 +5986,21 @@
           </a:prstGeom>
         </p:spPr>
       </p:pic>
-      <p:pic>
-        <p:nvPicPr>
-          <p:cNvPr id="7" name="Grafik 6" descr="Ein Bild, das Tisch enthält.&#10;&#10;Automatisch generierte Beschreibung">
-            <a:extLst>
-              <a:ext uri="{FF2B5EF4-FFF2-40B4-BE49-F238E27FC236}">
-                <a16:creationId xmlns:a16="http://schemas.microsoft.com/office/drawing/2014/main" id="{D6C80861-8A71-4655-A6B8-36C60C12CDDD}"/>
-              </a:ext>
-            </a:extLst>
-          </p:cNvPr>
-          <p:cNvPicPr>
-            <a:picLocks noChangeAspect="1"/>
-          </p:cNvPicPr>
+      <p:sp>
+        <p:nvSpPr>
+          <p:cNvPr id="8" name="Pfeil: nach rechts 7">
+            <a:extLst>
+              <a:ext uri="{FF2B5EF4-FFF2-40B4-BE49-F238E27FC236}">
+                <a16:creationId xmlns:a16="http://schemas.microsoft.com/office/drawing/2014/main" id="{70A4A1A5-C037-496C-9C85-93D8FBCFE177}"/>
+              </a:ext>
+            </a:extLst>
+          </p:cNvPr>
+          <p:cNvSpPr/>
           <p:nvPr/>
-        </p:nvPicPr>
-        <p:blipFill>
-          <a:blip r:embed="rId3"/>
-          <a:stretch>
-            <a:fillRect/>
-          </a:stretch>
-        </p:blipFill>
+        </p:nvSpPr>
         <p:spPr>
           <a:xfrm>
-            <a:off x="4269315" y="1752600"/>
-            <a:ext cx="4877481" cy="3978320"/>
-          </a:xfrm>
-          <a:prstGeom prst="rect">
-            <a:avLst/>
-          </a:prstGeom>
-        </p:spPr>
-      </p:pic>
-      <p:sp>
-        <p:nvSpPr>
-          <p:cNvPr id="8" name="Pfeil: nach rechts 7">
-            <a:extLst>
-              <a:ext uri="{FF2B5EF4-FFF2-40B4-BE49-F238E27FC236}">
-                <a16:creationId xmlns:a16="http://schemas.microsoft.com/office/drawing/2014/main" id="{70A4A1A5-C037-496C-9C85-93D8FBCFE177}"/>
-              </a:ext>
-            </a:extLst>
-          </p:cNvPr>
-          <p:cNvSpPr/>
-          <p:nvPr/>
-        </p:nvSpPr>
-        <p:spPr>
-          <a:xfrm>
-            <a:off x="3870324" y="3352800"/>
+            <a:off x="3755223" y="3352800"/>
             <a:ext cx="533400" cy="484632"/>
           </a:xfrm>
           <a:prstGeom prst="rightArrow">
@@ -6060,6 +6030,36 @@
           </a:p>
         </p:txBody>
       </p:sp>
+      <p:pic>
+        <p:nvPicPr>
+          <p:cNvPr id="10" name="Grafik 9" descr="Ein Bild, das Tisch enthält.&#10;&#10;Automatisch generierte Beschreibung">
+            <a:extLst>
+              <a:ext uri="{FF2B5EF4-FFF2-40B4-BE49-F238E27FC236}">
+                <a16:creationId xmlns:a16="http://schemas.microsoft.com/office/drawing/2014/main" id="{1D5F0325-41B0-43A1-818D-55BB3BF7CF64}"/>
+              </a:ext>
+            </a:extLst>
+          </p:cNvPr>
+          <p:cNvPicPr>
+            <a:picLocks noChangeAspect="1"/>
+          </p:cNvPicPr>
+          <p:nvPr/>
+        </p:nvPicPr>
+        <p:blipFill>
+          <a:blip r:embed="rId3"/>
+          <a:stretch>
+            <a:fillRect/>
+          </a:stretch>
+        </p:blipFill>
+        <p:spPr>
+          <a:xfrm>
+            <a:off x="4288623" y="1818455"/>
+            <a:ext cx="4779177" cy="3972745"/>
+          </a:xfrm>
+          <a:prstGeom prst="rect">
+            <a:avLst/>
+          </a:prstGeom>
+        </p:spPr>
+      </p:pic>
     </p:spTree>
     <p:extLst>
       <p:ext uri="{BB962C8B-B14F-4D97-AF65-F5344CB8AC3E}">

</xml_diff>

<commit_message>
new addition of other sources discussion
</commit_message>
<xml_diff>
--- a/presentations/2021-02-Fermi_prob_catalog_ECAP_ML.pptx
+++ b/presentations/2021-02-Fermi_prob_catalog_ECAP_ML.pptx
@@ -273,7 +273,7 @@
             <a:fld id="{3189ADB2-8830-3E4F-9C21-386BBEFF5ECC}" type="datetimeFigureOut">
               <a:rPr lang="en-US" smtClean="0"/>
               <a:pPr/>
-              <a:t>2/24/2021</a:t>
+              <a:t>2/25/2021</a:t>
             </a:fld>
             <a:endParaRPr lang="en-US"/>
           </a:p>
@@ -441,7 +441,7 @@
             <a:fld id="{C85F260B-6123-154B-904A-A1AB92F0D5FE}" type="datetimeFigureOut">
               <a:rPr lang="en-US" smtClean="0"/>
               <a:pPr/>
-              <a:t>2/24/2021</a:t>
+              <a:t>2/25/2021</a:t>
             </a:fld>
             <a:endParaRPr lang="en-US"/>
           </a:p>
@@ -1161,7 +1161,7 @@
           <a:p>
             <a:fld id="{103471C4-0DF0-FF4F-BCCC-44D2780D953F}" type="datetime1">
               <a:rPr lang="en-US" smtClean="0"/>
-              <a:t>2/24/2021</a:t>
+              <a:t>2/25/2021</a:t>
             </a:fld>
             <a:endParaRPr lang="en-US"/>
           </a:p>
@@ -1607,7 +1607,7 @@
           <a:p>
             <a:fld id="{D47E2586-09A2-8443-97E9-9E1CC8856BFD}" type="datetime1">
               <a:rPr lang="en-US" smtClean="0"/>
-              <a:t>2/24/2021</a:t>
+              <a:t>2/25/2021</a:t>
             </a:fld>
             <a:endParaRPr lang="en-US"/>
           </a:p>
@@ -2065,7 +2065,7 @@
           <a:p>
             <a:fld id="{E8002B35-DFF4-9049-843D-44A6085D396E}" type="datetime1">
               <a:rPr lang="en-US" smtClean="0"/>
-              <a:t>2/24/2021</a:t>
+              <a:t>2/25/2021</a:t>
             </a:fld>
             <a:endParaRPr lang="en-US"/>
           </a:p>
@@ -2216,7 +2216,7 @@
           <a:p>
             <a:fld id="{0F057E37-0DE7-3940-BEF3-BD3052280F27}" type="datetime1">
               <a:rPr lang="en-US" smtClean="0"/>
-              <a:t>2/24/2021</a:t>
+              <a:t>2/25/2021</a:t>
             </a:fld>
             <a:endParaRPr lang="en-US"/>
           </a:p>
@@ -2345,7 +2345,7 @@
           <a:p>
             <a:fld id="{779F7A2C-FB4C-AC44-A88F-A5CBCF0D32EC}" type="datetime1">
               <a:rPr lang="en-US" smtClean="0"/>
-              <a:t>2/24/2021</a:t>
+              <a:t>2/25/2021</a:t>
             </a:fld>
             <a:endParaRPr lang="en-US"/>
           </a:p>
@@ -2654,7 +2654,7 @@
           <a:p>
             <a:fld id="{F522DC46-DCD4-5941-8454-39336897E19D}" type="datetime1">
               <a:rPr lang="en-US" smtClean="0"/>
-              <a:t>2/24/2021</a:t>
+              <a:t>2/25/2021</a:t>
             </a:fld>
             <a:endParaRPr lang="en-US"/>
           </a:p>
@@ -3029,14 +3029,14 @@
           </a:ln>
           <a:extLst>
             <a:ext uri="{909E8E84-426E-40dd-AFC4-6F175D3DCCD1}">
-              <a14:hiddenFill xmlns:a14="http://schemas.microsoft.com/office/drawing/2010/main" xmlns="">
+              <a14:hiddenFill xmlns="" xmlns:a14="http://schemas.microsoft.com/office/drawing/2010/main">
                 <a:solidFill>
                   <a:srgbClr val="FFFFFF"/>
                 </a:solidFill>
               </a14:hiddenFill>
             </a:ext>
             <a:ext uri="{91240B29-F687-4f45-9708-019B960494DF}">
-              <a14:hiddenLine xmlns:a14="http://schemas.microsoft.com/office/drawing/2010/main" xmlns="" w="9525">
+              <a14:hiddenLine xmlns="" xmlns:a14="http://schemas.microsoft.com/office/drawing/2010/main" w="9525">
                 <a:solidFill>
                   <a:srgbClr val="000000"/>
                 </a:solidFill>
@@ -3046,7 +3046,7 @@
               </a14:hiddenLine>
             </a:ext>
             <a:ext uri="{FAA26D3D-D897-4be2-8F04-BA451C77F1D7}">
-              <ma14:placeholderFlag xmlns:ma14="http://schemas.microsoft.com/office/mac/drawingml/2011/main" xmlns="" val="1"/>
+              <ma14:placeholderFlag xmlns="" xmlns:ma14="http://schemas.microsoft.com/office/mac/drawingml/2011/main" val="1"/>
             </a:ext>
           </a:extLst>
         </p:spPr>
@@ -3222,7 +3222,7 @@
           <a:p>
             <a:fld id="{04DC5BFA-818F-8D40-A035-7726C59AF3B0}" type="datetime1">
               <a:rPr lang="en-US" smtClean="0"/>
-              <a:t>2/24/2021</a:t>
+              <a:t>2/25/2021</a:t>
             </a:fld>
             <a:endParaRPr lang="en-US"/>
           </a:p>
@@ -4055,14 +4055,14 @@
           </a:ln>
           <a:extLst>
             <a:ext uri="{909E8E84-426E-40dd-AFC4-6F175D3DCCD1}">
-              <a14:hiddenFill xmlns:a14="http://schemas.microsoft.com/office/drawing/2010/main" xmlns="">
+              <a14:hiddenFill xmlns="" xmlns:a14="http://schemas.microsoft.com/office/drawing/2010/main">
                 <a:solidFill>
                   <a:srgbClr val="FFFFFF"/>
                 </a:solidFill>
               </a14:hiddenFill>
             </a:ext>
             <a:ext uri="{91240B29-F687-4f45-9708-019B960494DF}">
-              <a14:hiddenLine xmlns:a14="http://schemas.microsoft.com/office/drawing/2010/main" xmlns="" w="9525">
+              <a14:hiddenLine xmlns="" xmlns:a14="http://schemas.microsoft.com/office/drawing/2010/main" w="9525">
                 <a:solidFill>
                   <a:srgbClr val="000000"/>
                 </a:solidFill>
@@ -4072,7 +4072,7 @@
               </a14:hiddenLine>
             </a:ext>
             <a:ext uri="{FAA26D3D-D897-4be2-8F04-BA451C77F1D7}">
-              <ma14:placeholderFlag xmlns:ma14="http://schemas.microsoft.com/office/mac/drawingml/2011/main" xmlns="" val="1"/>
+              <ma14:placeholderFlag xmlns="" xmlns:ma14="http://schemas.microsoft.com/office/mac/drawingml/2011/main" val="1"/>
             </a:ext>
           </a:extLst>
         </p:spPr>
@@ -8851,7 +8851,35 @@
           <a:p>
             <a:r>
               <a:rPr lang="en-US" dirty="0"/>
-              <a:t>We are working on a paper</a:t>
+              <a:t>Submitted to </a:t>
+            </a:r>
+            <a:r>
+              <a:rPr lang="en-US" dirty="0" err="1"/>
+              <a:t>Arxiv</a:t>
+            </a:r>
+            <a:r>
+              <a:rPr lang="en-US" dirty="0"/>
+              <a:t>. Sending to journal soon.</a:t>
+            </a:r>
+          </a:p>
+          <a:p>
+            <a:r>
+              <a:rPr lang="en-US" dirty="0"/>
+              <a:t>Possible future extension:</a:t>
+            </a:r>
+          </a:p>
+          <a:p>
+            <a:pPr lvl="1"/>
+            <a:r>
+              <a:rPr lang="en-US" dirty="0"/>
+              <a:t>Subtypes of AGNs, e.g. BL Lacs and FSRQs.</a:t>
+            </a:r>
+          </a:p>
+          <a:p>
+            <a:pPr lvl="1"/>
+            <a:r>
+              <a:rPr lang="en-US" dirty="0"/>
+              <a:t>Usage of all classes in 3FGL and 4FGL?</a:t>
             </a:r>
           </a:p>
         </p:txBody>

</xml_diff>